<commit_message>
Docs, Presentation and list users
</commit_message>
<xml_diff>
--- a/project/docs/Presentation.pptx
+++ b/project/docs/Presentation.pptx
@@ -2,7 +2,7 @@
 <file path=ppt/presentation.xml><?xml version="1.0" encoding="utf-8"?>
 <p:presentation xmlns:a="http://schemas.openxmlformats.org/drawingml/2006/main" xmlns:r="http://schemas.openxmlformats.org/officeDocument/2006/relationships" xmlns:p="http://schemas.openxmlformats.org/presentationml/2006/main" saveSubsetFonts="1">
   <p:sldMasterIdLst>
-    <p:sldMasterId id="2147483648" r:id="rId1"/>
+    <p:sldMasterId id="2147483660" r:id="rId1"/>
   </p:sldMasterIdLst>
   <p:sldIdLst>
     <p:sldId id="256" r:id="rId2"/>
@@ -17,9 +17,9 @@
   <p:notesSz cx="6858000" cy="9144000"/>
   <p:defaultTextStyle>
     <a:defPPr>
-      <a:defRPr lang="bg-BG"/>
+      <a:defRPr lang="en-US"/>
     </a:defPPr>
-    <a:lvl1pPr marL="0" algn="l" defTabSz="914400" rtl="0" eaLnBrk="1" latinLnBrk="0" hangingPunct="1">
+    <a:lvl1pPr marL="0" algn="l" defTabSz="457200" rtl="0" eaLnBrk="1" latinLnBrk="0" hangingPunct="1">
       <a:defRPr sz="1800" kern="1200">
         <a:solidFill>
           <a:schemeClr val="tx1"/>
@@ -29,7 +29,7 @@
         <a:cs typeface="+mn-cs"/>
       </a:defRPr>
     </a:lvl1pPr>
-    <a:lvl2pPr marL="457200" algn="l" defTabSz="914400" rtl="0" eaLnBrk="1" latinLnBrk="0" hangingPunct="1">
+    <a:lvl2pPr marL="457200" algn="l" defTabSz="457200" rtl="0" eaLnBrk="1" latinLnBrk="0" hangingPunct="1">
       <a:defRPr sz="1800" kern="1200">
         <a:solidFill>
           <a:schemeClr val="tx1"/>
@@ -39,7 +39,7 @@
         <a:cs typeface="+mn-cs"/>
       </a:defRPr>
     </a:lvl2pPr>
-    <a:lvl3pPr marL="914400" algn="l" defTabSz="914400" rtl="0" eaLnBrk="1" latinLnBrk="0" hangingPunct="1">
+    <a:lvl3pPr marL="914400" algn="l" defTabSz="457200" rtl="0" eaLnBrk="1" latinLnBrk="0" hangingPunct="1">
       <a:defRPr sz="1800" kern="1200">
         <a:solidFill>
           <a:schemeClr val="tx1"/>
@@ -49,7 +49,7 @@
         <a:cs typeface="+mn-cs"/>
       </a:defRPr>
     </a:lvl3pPr>
-    <a:lvl4pPr marL="1371600" algn="l" defTabSz="914400" rtl="0" eaLnBrk="1" latinLnBrk="0" hangingPunct="1">
+    <a:lvl4pPr marL="1371600" algn="l" defTabSz="457200" rtl="0" eaLnBrk="1" latinLnBrk="0" hangingPunct="1">
       <a:defRPr sz="1800" kern="1200">
         <a:solidFill>
           <a:schemeClr val="tx1"/>
@@ -59,7 +59,7 @@
         <a:cs typeface="+mn-cs"/>
       </a:defRPr>
     </a:lvl4pPr>
-    <a:lvl5pPr marL="1828800" algn="l" defTabSz="914400" rtl="0" eaLnBrk="1" latinLnBrk="0" hangingPunct="1">
+    <a:lvl5pPr marL="1828800" algn="l" defTabSz="457200" rtl="0" eaLnBrk="1" latinLnBrk="0" hangingPunct="1">
       <a:defRPr sz="1800" kern="1200">
         <a:solidFill>
           <a:schemeClr val="tx1"/>
@@ -69,7 +69,7 @@
         <a:cs typeface="+mn-cs"/>
       </a:defRPr>
     </a:lvl5pPr>
-    <a:lvl6pPr marL="2286000" algn="l" defTabSz="914400" rtl="0" eaLnBrk="1" latinLnBrk="0" hangingPunct="1">
+    <a:lvl6pPr marL="2286000" algn="l" defTabSz="457200" rtl="0" eaLnBrk="1" latinLnBrk="0" hangingPunct="1">
       <a:defRPr sz="1800" kern="1200">
         <a:solidFill>
           <a:schemeClr val="tx1"/>
@@ -79,7 +79,7 @@
         <a:cs typeface="+mn-cs"/>
       </a:defRPr>
     </a:lvl6pPr>
-    <a:lvl7pPr marL="2743200" algn="l" defTabSz="914400" rtl="0" eaLnBrk="1" latinLnBrk="0" hangingPunct="1">
+    <a:lvl7pPr marL="2743200" algn="l" defTabSz="457200" rtl="0" eaLnBrk="1" latinLnBrk="0" hangingPunct="1">
       <a:defRPr sz="1800" kern="1200">
         <a:solidFill>
           <a:schemeClr val="tx1"/>
@@ -89,7 +89,7 @@
         <a:cs typeface="+mn-cs"/>
       </a:defRPr>
     </a:lvl7pPr>
-    <a:lvl8pPr marL="3200400" algn="l" defTabSz="914400" rtl="0" eaLnBrk="1" latinLnBrk="0" hangingPunct="1">
+    <a:lvl8pPr marL="3200400" algn="l" defTabSz="457200" rtl="0" eaLnBrk="1" latinLnBrk="0" hangingPunct="1">
       <a:defRPr sz="1800" kern="1200">
         <a:solidFill>
           <a:schemeClr val="tx1"/>
@@ -99,7 +99,7 @@
         <a:cs typeface="+mn-cs"/>
       </a:defRPr>
     </a:lvl8pPr>
-    <a:lvl9pPr marL="3657600" algn="l" defTabSz="914400" rtl="0" eaLnBrk="1" latinLnBrk="0" hangingPunct="1">
+    <a:lvl9pPr marL="3657600" algn="l" defTabSz="457200" rtl="0" eaLnBrk="1" latinLnBrk="0" hangingPunct="1">
       <a:defRPr sz="1800" kern="1200">
         <a:solidFill>
           <a:schemeClr val="tx1"/>
@@ -110,12 +110,25 @@
       </a:defRPr>
     </a:lvl9pPr>
   </p:defaultTextStyle>
+  <p:extLst>
+    <p:ext uri="{EFAFB233-063F-42B5-8137-9DF3F51BA10A}">
+      <p15:sldGuideLst xmlns:p15="http://schemas.microsoft.com/office/powerpoint/2012/main"/>
+    </p:ext>
+  </p:extLst>
 </p:presentation>
 </file>
 
 <file path=ppt/slideLayouts/slideLayout1.xml><?xml version="1.0" encoding="utf-8"?>
 <p:sldLayout xmlns:a="http://schemas.openxmlformats.org/drawingml/2006/main" xmlns:r="http://schemas.openxmlformats.org/officeDocument/2006/relationships" xmlns:p="http://schemas.openxmlformats.org/presentationml/2006/main" type="title" preserve="1">
   <p:cSld name="Заглавен слайд">
+    <p:bg>
+      <p:bgPr>
+        <a:solidFill>
+          <a:schemeClr val="accent1"/>
+        </a:solidFill>
+        <a:effectLst/>
+      </p:bgPr>
+    </p:bg>
     <p:spTree>
       <p:nvGrpSpPr>
         <p:cNvPr id="1" name=""/>
@@ -132,31 +145,69 @@
       </p:grpSpPr>
       <p:sp>
         <p:nvSpPr>
-          <p:cNvPr id="2" name="Заглавие 1">
-            <a:extLst>
-              <a:ext uri="{FF2B5EF4-FFF2-40B4-BE49-F238E27FC236}">
-                <a16:creationId xmlns:a16="http://schemas.microsoft.com/office/drawing/2014/main" id="{89F4CE69-AA2E-4C8F-ADBA-B913A956A48E}"/>
-              </a:ext>
-            </a:extLst>
-          </p:cNvPr>
-          <p:cNvSpPr>
-            <a:spLocks noGrp="1"/>
-          </p:cNvSpPr>
-          <p:nvPr>
-            <p:ph type="ctrTitle"/>
-          </p:nvPr>
+          <p:cNvPr id="4" name="Rectangle 3"/>
+          <p:cNvSpPr/>
+          <p:nvPr/>
         </p:nvSpPr>
         <p:spPr>
           <a:xfrm>
-            <a:off x="1524000" y="1122363"/>
-            <a:ext cx="9144000" cy="2387600"/>
+            <a:off x="0" y="0"/>
+            <a:ext cx="12192000" cy="6858000"/>
+          </a:xfrm>
+          <a:prstGeom prst="rect">
+            <a:avLst/>
+          </a:prstGeom>
+          <a:ln>
+            <a:noFill/>
+          </a:ln>
+        </p:spPr>
+        <p:style>
+          <a:lnRef idx="2">
+            <a:schemeClr val="accent1">
+              <a:shade val="50000"/>
+            </a:schemeClr>
+          </a:lnRef>
+          <a:fillRef idx="1">
+            <a:schemeClr val="accent1"/>
+          </a:fillRef>
+          <a:effectRef idx="0">
+            <a:schemeClr val="accent1"/>
+          </a:effectRef>
+          <a:fontRef idx="minor">
+            <a:schemeClr val="lt1"/>
+          </a:fontRef>
+        </p:style>
+      </p:sp>
+      <p:sp>
+        <p:nvSpPr>
+          <p:cNvPr id="2" name="Title 1"/>
+          <p:cNvSpPr>
+            <a:spLocks noGrp="1"/>
+          </p:cNvSpPr>
+          <p:nvPr>
+            <p:ph type="ctrTitle"/>
+          </p:nvPr>
+        </p:nvSpPr>
+        <p:spPr>
+          <a:xfrm>
+            <a:off x="603504" y="770467"/>
+            <a:ext cx="10782300" cy="3352800"/>
           </a:xfrm>
         </p:spPr>
         <p:txBody>
-          <a:bodyPr anchor="b"/>
+          <a:bodyPr anchor="b">
+            <a:noAutofit/>
+          </a:bodyPr>
           <a:lstStyle>
-            <a:lvl1pPr algn="ctr">
-              <a:defRPr sz="6000"/>
+            <a:lvl1pPr algn="l">
+              <a:lnSpc>
+                <a:spcPct val="80000"/>
+              </a:lnSpc>
+              <a:defRPr sz="8800" spc="-120" baseline="0">
+                <a:solidFill>
+                  <a:srgbClr val="FFFFFF"/>
+                </a:solidFill>
+              </a:defRPr>
             </a:lvl1pPr>
           </a:lstStyle>
           <a:p>
@@ -164,18 +215,13 @@
               <a:rPr lang="bg-BG"/>
               <a:t>Редакт. стил загл. образец</a:t>
             </a:r>
-          </a:p>
-        </p:txBody>
-      </p:sp>
-      <p:sp>
-        <p:nvSpPr>
-          <p:cNvPr id="3" name="Подзаглавие 2">
-            <a:extLst>
-              <a:ext uri="{FF2B5EF4-FFF2-40B4-BE49-F238E27FC236}">
-                <a16:creationId xmlns:a16="http://schemas.microsoft.com/office/drawing/2014/main" id="{1B796B79-E7A5-4306-904A-EF6A74085D8C}"/>
-              </a:ext>
-            </a:extLst>
-          </p:cNvPr>
+            <a:endParaRPr lang="en-US" dirty="0"/>
+          </a:p>
+        </p:txBody>
+      </p:sp>
+      <p:sp>
+        <p:nvSpPr>
+          <p:cNvPr id="3" name="Subtitle 2"/>
           <p:cNvSpPr>
             <a:spLocks noGrp="1"/>
           </p:cNvSpPr>
@@ -185,82 +231,94 @@
         </p:nvSpPr>
         <p:spPr>
           <a:xfrm>
-            <a:off x="1524000" y="3602038"/>
-            <a:ext cx="9144000" cy="1655762"/>
+            <a:off x="667512" y="4206876"/>
+            <a:ext cx="9228201" cy="1645920"/>
           </a:xfrm>
         </p:spPr>
         <p:txBody>
+          <a:bodyPr>
+            <a:normAutofit/>
+          </a:bodyPr>
+          <a:lstStyle>
+            <a:lvl1pPr marL="0" indent="0" algn="l">
+              <a:buNone/>
+              <a:defRPr sz="3200">
+                <a:solidFill>
+                  <a:schemeClr val="bg1"/>
+                </a:solidFill>
+                <a:latin typeface="+mj-lt"/>
+              </a:defRPr>
+            </a:lvl1pPr>
+            <a:lvl2pPr marL="457200" indent="0" algn="ctr">
+              <a:buNone/>
+              <a:defRPr sz="2800"/>
+            </a:lvl2pPr>
+            <a:lvl3pPr marL="914400" indent="0" algn="ctr">
+              <a:buNone/>
+              <a:defRPr sz="2400"/>
+            </a:lvl3pPr>
+            <a:lvl4pPr marL="1371600" indent="0" algn="ctr">
+              <a:buNone/>
+              <a:defRPr sz="2000"/>
+            </a:lvl4pPr>
+            <a:lvl5pPr marL="1828800" indent="0" algn="ctr">
+              <a:buNone/>
+              <a:defRPr sz="2000"/>
+            </a:lvl5pPr>
+            <a:lvl6pPr marL="2286000" indent="0" algn="ctr">
+              <a:buNone/>
+              <a:defRPr sz="2000"/>
+            </a:lvl6pPr>
+            <a:lvl7pPr marL="2743200" indent="0" algn="ctr">
+              <a:buNone/>
+              <a:defRPr sz="2000"/>
+            </a:lvl7pPr>
+            <a:lvl8pPr marL="3200400" indent="0" algn="ctr">
+              <a:buNone/>
+              <a:defRPr sz="2000"/>
+            </a:lvl8pPr>
+            <a:lvl9pPr marL="3657600" indent="0" algn="ctr">
+              <a:buNone/>
+              <a:defRPr sz="2000"/>
+            </a:lvl9pPr>
+          </a:lstStyle>
+          <a:p>
+            <a:r>
+              <a:rPr lang="bg-BG"/>
+              <a:t>Щракнете, за да редактирате стила на подзаглавието в образеца</a:t>
+            </a:r>
+            <a:endParaRPr lang="en-US" dirty="0"/>
+          </a:p>
+        </p:txBody>
+      </p:sp>
+      <p:sp>
+        <p:nvSpPr>
+          <p:cNvPr id="7" name="Date Placeholder 6"/>
+          <p:cNvSpPr>
+            <a:spLocks noGrp="1"/>
+          </p:cNvSpPr>
+          <p:nvPr>
+            <p:ph type="dt" sz="half" idx="10"/>
+          </p:nvPr>
+        </p:nvSpPr>
+        <p:spPr/>
+        <p:txBody>
           <a:bodyPr/>
           <a:lstStyle>
-            <a:lvl1pPr marL="0" indent="0" algn="ctr">
-              <a:buNone/>
-              <a:defRPr sz="2400"/>
+            <a:lvl1pPr>
+              <a:defRPr>
+                <a:solidFill>
+                  <a:srgbClr val="FFFFFF">
+                    <a:alpha val="80000"/>
+                  </a:srgbClr>
+                </a:solidFill>
+              </a:defRPr>
             </a:lvl1pPr>
-            <a:lvl2pPr marL="457200" indent="0" algn="ctr">
-              <a:buNone/>
-              <a:defRPr sz="2000"/>
-            </a:lvl2pPr>
-            <a:lvl3pPr marL="914400" indent="0" algn="ctr">
-              <a:buNone/>
-              <a:defRPr sz="1800"/>
-            </a:lvl3pPr>
-            <a:lvl4pPr marL="1371600" indent="0" algn="ctr">
-              <a:buNone/>
-              <a:defRPr sz="1600"/>
-            </a:lvl4pPr>
-            <a:lvl5pPr marL="1828800" indent="0" algn="ctr">
-              <a:buNone/>
-              <a:defRPr sz="1600"/>
-            </a:lvl5pPr>
-            <a:lvl6pPr marL="2286000" indent="0" algn="ctr">
-              <a:buNone/>
-              <a:defRPr sz="1600"/>
-            </a:lvl6pPr>
-            <a:lvl7pPr marL="2743200" indent="0" algn="ctr">
-              <a:buNone/>
-              <a:defRPr sz="1600"/>
-            </a:lvl7pPr>
-            <a:lvl8pPr marL="3200400" indent="0" algn="ctr">
-              <a:buNone/>
-              <a:defRPr sz="1600"/>
-            </a:lvl8pPr>
-            <a:lvl9pPr marL="3657600" indent="0" algn="ctr">
-              <a:buNone/>
-              <a:defRPr sz="1600"/>
-            </a:lvl9pPr>
           </a:lstStyle>
-          <a:p>
-            <a:r>
-              <a:rPr lang="bg-BG"/>
-              <a:t>Щракнете, за да редактирате стила на подзаглавието в образеца</a:t>
-            </a:r>
-          </a:p>
-        </p:txBody>
-      </p:sp>
-      <p:sp>
-        <p:nvSpPr>
-          <p:cNvPr id="4" name="Контейнер за дата 3">
-            <a:extLst>
-              <a:ext uri="{FF2B5EF4-FFF2-40B4-BE49-F238E27FC236}">
-                <a16:creationId xmlns:a16="http://schemas.microsoft.com/office/drawing/2014/main" id="{7467A335-A777-4725-9596-C3236F641073}"/>
-              </a:ext>
-            </a:extLst>
-          </p:cNvPr>
-          <p:cNvSpPr>
-            <a:spLocks noGrp="1"/>
-          </p:cNvSpPr>
-          <p:nvPr>
-            <p:ph type="dt" sz="half" idx="10"/>
-          </p:nvPr>
-        </p:nvSpPr>
-        <p:spPr/>
-        <p:txBody>
-          <a:bodyPr/>
-          <a:lstStyle/>
           <a:p>
             <a:fld id="{B87BE1AF-0DBD-45C4-9B05-CB9899123DA5}" type="datetimeFigureOut">
               <a:rPr lang="bg-BG" smtClean="0"/>
-              <a:t>1.7.2022 г.</a:t>
+              <a:t>3.7.2022 г.</a:t>
             </a:fld>
             <a:endParaRPr lang="bg-BG"/>
           </a:p>
@@ -268,13 +326,7 @@
       </p:sp>
       <p:sp>
         <p:nvSpPr>
-          <p:cNvPr id="5" name="Контейнер за долния колонтитул 4">
-            <a:extLst>
-              <a:ext uri="{FF2B5EF4-FFF2-40B4-BE49-F238E27FC236}">
-                <a16:creationId xmlns:a16="http://schemas.microsoft.com/office/drawing/2014/main" id="{3F7FB4C0-6BF2-4D7D-B58E-7704387D18B6}"/>
-              </a:ext>
-            </a:extLst>
-          </p:cNvPr>
+          <p:cNvPr id="8" name="Footer Placeholder 7"/>
           <p:cNvSpPr>
             <a:spLocks noGrp="1"/>
           </p:cNvSpPr>
@@ -285,7 +337,17 @@
         <p:spPr/>
         <p:txBody>
           <a:bodyPr/>
-          <a:lstStyle/>
+          <a:lstStyle>
+            <a:lvl1pPr>
+              <a:defRPr>
+                <a:solidFill>
+                  <a:srgbClr val="FFFFFF">
+                    <a:alpha val="80000"/>
+                  </a:srgbClr>
+                </a:solidFill>
+              </a:defRPr>
+            </a:lvl1pPr>
+          </a:lstStyle>
           <a:p>
             <a:endParaRPr lang="bg-BG"/>
           </a:p>
@@ -293,13 +355,7 @@
       </p:sp>
       <p:sp>
         <p:nvSpPr>
-          <p:cNvPr id="6" name="Контейнер за номер на слайда 5">
-            <a:extLst>
-              <a:ext uri="{FF2B5EF4-FFF2-40B4-BE49-F238E27FC236}">
-                <a16:creationId xmlns:a16="http://schemas.microsoft.com/office/drawing/2014/main" id="{306D8BC5-AEDF-4FB1-8F40-8E6B97F28C36}"/>
-              </a:ext>
-            </a:extLst>
-          </p:cNvPr>
+          <p:cNvPr id="9" name="Slide Number Placeholder 8"/>
           <p:cNvSpPr>
             <a:spLocks noGrp="1"/>
           </p:cNvSpPr>
@@ -310,7 +366,17 @@
         <p:spPr/>
         <p:txBody>
           <a:bodyPr/>
-          <a:lstStyle/>
+          <a:lstStyle>
+            <a:lvl1pPr>
+              <a:defRPr>
+                <a:solidFill>
+                  <a:srgbClr val="FFFFFF">
+                    <a:alpha val="25000"/>
+                  </a:srgbClr>
+                </a:solidFill>
+              </a:defRPr>
+            </a:lvl1pPr>
+          </a:lstStyle>
           <a:p>
             <a:fld id="{2DFCFB94-C649-4E33-8A46-39CA7AB586A3}" type="slidenum">
               <a:rPr lang="bg-BG" smtClean="0"/>
@@ -323,7 +389,7 @@
     </p:spTree>
     <p:extLst>
       <p:ext uri="{BB962C8B-B14F-4D97-AF65-F5344CB8AC3E}">
-        <p14:creationId xmlns:p14="http://schemas.microsoft.com/office/powerpoint/2010/main" val="4049525533"/>
+        <p14:creationId xmlns:p14="http://schemas.microsoft.com/office/powerpoint/2010/main" val="276773512"/>
       </p:ext>
     </p:extLst>
   </p:cSld>
@@ -352,13 +418,7 @@
       </p:grpSpPr>
       <p:sp>
         <p:nvSpPr>
-          <p:cNvPr id="2" name="Заглавие 1">
-            <a:extLst>
-              <a:ext uri="{FF2B5EF4-FFF2-40B4-BE49-F238E27FC236}">
-                <a16:creationId xmlns:a16="http://schemas.microsoft.com/office/drawing/2014/main" id="{7543C54F-087C-405D-BC63-33E93AC00E47}"/>
-              </a:ext>
-            </a:extLst>
-          </p:cNvPr>
+          <p:cNvPr id="2" name="Title 1"/>
           <p:cNvSpPr>
             <a:spLocks noGrp="1"/>
           </p:cNvSpPr>
@@ -375,18 +435,13 @@
               <a:rPr lang="bg-BG"/>
               <a:t>Редакт. стил загл. образец</a:t>
             </a:r>
-          </a:p>
-        </p:txBody>
-      </p:sp>
-      <p:sp>
-        <p:nvSpPr>
-          <p:cNvPr id="3" name="Контейнер за вертикален текст 2">
-            <a:extLst>
-              <a:ext uri="{FF2B5EF4-FFF2-40B4-BE49-F238E27FC236}">
-                <a16:creationId xmlns:a16="http://schemas.microsoft.com/office/drawing/2014/main" id="{C06D95C7-F4D5-42E2-9173-D951C407ACB0}"/>
-              </a:ext>
-            </a:extLst>
-          </p:cNvPr>
+            <a:endParaRPr lang="en-US" dirty="0"/>
+          </a:p>
+        </p:txBody>
+      </p:sp>
+      <p:sp>
+        <p:nvSpPr>
+          <p:cNvPr id="3" name="Vertical Text Placeholder 2"/>
           <p:cNvSpPr>
             <a:spLocks noGrp="1"/>
           </p:cNvSpPr>
@@ -432,18 +487,13 @@
               <a:rPr lang="bg-BG"/>
               <a:t>Пето ниво</a:t>
             </a:r>
-          </a:p>
-        </p:txBody>
-      </p:sp>
-      <p:sp>
-        <p:nvSpPr>
-          <p:cNvPr id="4" name="Контейнер за дата 3">
-            <a:extLst>
-              <a:ext uri="{FF2B5EF4-FFF2-40B4-BE49-F238E27FC236}">
-                <a16:creationId xmlns:a16="http://schemas.microsoft.com/office/drawing/2014/main" id="{88E3D255-EBDD-4BA8-BDE7-93F94129E981}"/>
-              </a:ext>
-            </a:extLst>
-          </p:cNvPr>
+            <a:endParaRPr lang="en-US" dirty="0"/>
+          </a:p>
+        </p:txBody>
+      </p:sp>
+      <p:sp>
+        <p:nvSpPr>
+          <p:cNvPr id="4" name="Date Placeholder 3"/>
           <p:cNvSpPr>
             <a:spLocks noGrp="1"/>
           </p:cNvSpPr>
@@ -458,7 +508,7 @@
           <a:p>
             <a:fld id="{B87BE1AF-0DBD-45C4-9B05-CB9899123DA5}" type="datetimeFigureOut">
               <a:rPr lang="bg-BG" smtClean="0"/>
-              <a:t>1.7.2022 г.</a:t>
+              <a:t>3.7.2022 г.</a:t>
             </a:fld>
             <a:endParaRPr lang="bg-BG"/>
           </a:p>
@@ -466,13 +516,7 @@
       </p:sp>
       <p:sp>
         <p:nvSpPr>
-          <p:cNvPr id="5" name="Контейнер за долния колонтитул 4">
-            <a:extLst>
-              <a:ext uri="{FF2B5EF4-FFF2-40B4-BE49-F238E27FC236}">
-                <a16:creationId xmlns:a16="http://schemas.microsoft.com/office/drawing/2014/main" id="{710CF1E1-CF80-4465-B5B9-29251A58F230}"/>
-              </a:ext>
-            </a:extLst>
-          </p:cNvPr>
+          <p:cNvPr id="5" name="Footer Placeholder 4"/>
           <p:cNvSpPr>
             <a:spLocks noGrp="1"/>
           </p:cNvSpPr>
@@ -491,13 +535,7 @@
       </p:sp>
       <p:sp>
         <p:nvSpPr>
-          <p:cNvPr id="6" name="Контейнер за номер на слайда 5">
-            <a:extLst>
-              <a:ext uri="{FF2B5EF4-FFF2-40B4-BE49-F238E27FC236}">
-                <a16:creationId xmlns:a16="http://schemas.microsoft.com/office/drawing/2014/main" id="{643C5172-8A59-4DAD-B6CA-A0A73680B0D9}"/>
-              </a:ext>
-            </a:extLst>
-          </p:cNvPr>
+          <p:cNvPr id="6" name="Slide Number Placeholder 5"/>
           <p:cNvSpPr>
             <a:spLocks noGrp="1"/>
           </p:cNvSpPr>
@@ -521,7 +559,7 @@
     </p:spTree>
     <p:extLst>
       <p:ext uri="{BB962C8B-B14F-4D97-AF65-F5344CB8AC3E}">
-        <p14:creationId xmlns:p14="http://schemas.microsoft.com/office/powerpoint/2010/main" val="2079859578"/>
+        <p14:creationId xmlns:p14="http://schemas.microsoft.com/office/powerpoint/2010/main" val="957227905"/>
       </p:ext>
     </p:extLst>
   </p:cSld>
@@ -550,13 +588,7 @@
       </p:grpSpPr>
       <p:sp>
         <p:nvSpPr>
-          <p:cNvPr id="2" name="Вертикално заглавие 1">
-            <a:extLst>
-              <a:ext uri="{FF2B5EF4-FFF2-40B4-BE49-F238E27FC236}">
-                <a16:creationId xmlns:a16="http://schemas.microsoft.com/office/drawing/2014/main" id="{E70C7B21-20EC-4967-BB8A-9D8680459816}"/>
-              </a:ext>
-            </a:extLst>
-          </p:cNvPr>
+          <p:cNvPr id="2" name="Vertical Title 1"/>
           <p:cNvSpPr>
             <a:spLocks noGrp="1"/>
           </p:cNvSpPr>
@@ -566,8 +598,8 @@
         </p:nvSpPr>
         <p:spPr>
           <a:xfrm>
-            <a:off x="8724900" y="365125"/>
-            <a:ext cx="2628900" cy="5811838"/>
+            <a:off x="8743950" y="695325"/>
+            <a:ext cx="2628900" cy="4800600"/>
           </a:xfrm>
         </p:spPr>
         <p:txBody>
@@ -578,18 +610,13 @@
               <a:rPr lang="bg-BG"/>
               <a:t>Редакт. стил загл. образец</a:t>
             </a:r>
-          </a:p>
-        </p:txBody>
-      </p:sp>
-      <p:sp>
-        <p:nvSpPr>
-          <p:cNvPr id="3" name="Контейнер за вертикален текст 2">
-            <a:extLst>
-              <a:ext uri="{FF2B5EF4-FFF2-40B4-BE49-F238E27FC236}">
-                <a16:creationId xmlns:a16="http://schemas.microsoft.com/office/drawing/2014/main" id="{4C219DEF-A978-4310-89CF-8DF307A4D5E6}"/>
-              </a:ext>
-            </a:extLst>
-          </p:cNvPr>
+            <a:endParaRPr lang="en-US" dirty="0"/>
+          </a:p>
+        </p:txBody>
+      </p:sp>
+      <p:sp>
+        <p:nvSpPr>
+          <p:cNvPr id="3" name="Vertical Text Placeholder 2"/>
           <p:cNvSpPr>
             <a:spLocks noGrp="1"/>
           </p:cNvSpPr>
@@ -599,8 +626,8 @@
         </p:nvSpPr>
         <p:spPr>
           <a:xfrm>
-            <a:off x="838200" y="365125"/>
-            <a:ext cx="7734300" cy="5811838"/>
+            <a:off x="771525" y="714375"/>
+            <a:ext cx="7734300" cy="5400675"/>
           </a:xfrm>
         </p:spPr>
         <p:txBody>
@@ -640,18 +667,13 @@
               <a:rPr lang="bg-BG"/>
               <a:t>Пето ниво</a:t>
             </a:r>
-          </a:p>
-        </p:txBody>
-      </p:sp>
-      <p:sp>
-        <p:nvSpPr>
-          <p:cNvPr id="4" name="Контейнер за дата 3">
-            <a:extLst>
-              <a:ext uri="{FF2B5EF4-FFF2-40B4-BE49-F238E27FC236}">
-                <a16:creationId xmlns:a16="http://schemas.microsoft.com/office/drawing/2014/main" id="{7BBB45A9-3E6B-4675-A9FD-4CECBFFF3BC9}"/>
-              </a:ext>
-            </a:extLst>
-          </p:cNvPr>
+            <a:endParaRPr lang="en-US" dirty="0"/>
+          </a:p>
+        </p:txBody>
+      </p:sp>
+      <p:sp>
+        <p:nvSpPr>
+          <p:cNvPr id="4" name="Date Placeholder 3"/>
           <p:cNvSpPr>
             <a:spLocks noGrp="1"/>
           </p:cNvSpPr>
@@ -666,7 +688,7 @@
           <a:p>
             <a:fld id="{B87BE1AF-0DBD-45C4-9B05-CB9899123DA5}" type="datetimeFigureOut">
               <a:rPr lang="bg-BG" smtClean="0"/>
-              <a:t>1.7.2022 г.</a:t>
+              <a:t>3.7.2022 г.</a:t>
             </a:fld>
             <a:endParaRPr lang="bg-BG"/>
           </a:p>
@@ -674,13 +696,7 @@
       </p:sp>
       <p:sp>
         <p:nvSpPr>
-          <p:cNvPr id="5" name="Контейнер за долния колонтитул 4">
-            <a:extLst>
-              <a:ext uri="{FF2B5EF4-FFF2-40B4-BE49-F238E27FC236}">
-                <a16:creationId xmlns:a16="http://schemas.microsoft.com/office/drawing/2014/main" id="{FF30872E-1788-4296-8216-35444305956A}"/>
-              </a:ext>
-            </a:extLst>
-          </p:cNvPr>
+          <p:cNvPr id="5" name="Footer Placeholder 4"/>
           <p:cNvSpPr>
             <a:spLocks noGrp="1"/>
           </p:cNvSpPr>
@@ -699,13 +715,7 @@
       </p:sp>
       <p:sp>
         <p:nvSpPr>
-          <p:cNvPr id="6" name="Контейнер за номер на слайда 5">
-            <a:extLst>
-              <a:ext uri="{FF2B5EF4-FFF2-40B4-BE49-F238E27FC236}">
-                <a16:creationId xmlns:a16="http://schemas.microsoft.com/office/drawing/2014/main" id="{8E1CA73C-95A5-409F-9CF4-D096E9701E76}"/>
-              </a:ext>
-            </a:extLst>
-          </p:cNvPr>
+          <p:cNvPr id="6" name="Slide Number Placeholder 5"/>
           <p:cNvSpPr>
             <a:spLocks noGrp="1"/>
           </p:cNvSpPr>
@@ -729,7 +739,7 @@
     </p:spTree>
     <p:extLst>
       <p:ext uri="{BB962C8B-B14F-4D97-AF65-F5344CB8AC3E}">
-        <p14:creationId xmlns:p14="http://schemas.microsoft.com/office/powerpoint/2010/main" val="3520889185"/>
+        <p14:creationId xmlns:p14="http://schemas.microsoft.com/office/powerpoint/2010/main" val="1381149106"/>
       </p:ext>
     </p:extLst>
   </p:cSld>
@@ -758,13 +768,7 @@
       </p:grpSpPr>
       <p:sp>
         <p:nvSpPr>
-          <p:cNvPr id="2" name="Заглавие 1">
-            <a:extLst>
-              <a:ext uri="{FF2B5EF4-FFF2-40B4-BE49-F238E27FC236}">
-                <a16:creationId xmlns:a16="http://schemas.microsoft.com/office/drawing/2014/main" id="{FB802AD8-C479-4312-9FBD-5DFD700AD0C1}"/>
-              </a:ext>
-            </a:extLst>
-          </p:cNvPr>
+          <p:cNvPr id="2" name="Title 1"/>
           <p:cNvSpPr>
             <a:spLocks noGrp="1"/>
           </p:cNvSpPr>
@@ -781,18 +785,13 @@
               <a:rPr lang="bg-BG"/>
               <a:t>Редакт. стил загл. образец</a:t>
             </a:r>
-          </a:p>
-        </p:txBody>
-      </p:sp>
-      <p:sp>
-        <p:nvSpPr>
-          <p:cNvPr id="3" name="Контейнер за съдържание 2">
-            <a:extLst>
-              <a:ext uri="{FF2B5EF4-FFF2-40B4-BE49-F238E27FC236}">
-                <a16:creationId xmlns:a16="http://schemas.microsoft.com/office/drawing/2014/main" id="{89924BE6-3AFB-43AA-B05E-4DFFCDA9A1A2}"/>
-              </a:ext>
-            </a:extLst>
-          </p:cNvPr>
+            <a:endParaRPr lang="en-US" dirty="0"/>
+          </a:p>
+        </p:txBody>
+      </p:sp>
+      <p:sp>
+        <p:nvSpPr>
+          <p:cNvPr id="3" name="Content Placeholder 2"/>
           <p:cNvSpPr>
             <a:spLocks noGrp="1"/>
           </p:cNvSpPr>
@@ -838,18 +837,13 @@
               <a:rPr lang="bg-BG"/>
               <a:t>Пето ниво</a:t>
             </a:r>
-          </a:p>
-        </p:txBody>
-      </p:sp>
-      <p:sp>
-        <p:nvSpPr>
-          <p:cNvPr id="4" name="Контейнер за дата 3">
-            <a:extLst>
-              <a:ext uri="{FF2B5EF4-FFF2-40B4-BE49-F238E27FC236}">
-                <a16:creationId xmlns:a16="http://schemas.microsoft.com/office/drawing/2014/main" id="{C5D1AF2E-2203-48C9-958A-53BFE7D6D90A}"/>
-              </a:ext>
-            </a:extLst>
-          </p:cNvPr>
+            <a:endParaRPr lang="en-US" dirty="0"/>
+          </a:p>
+        </p:txBody>
+      </p:sp>
+      <p:sp>
+        <p:nvSpPr>
+          <p:cNvPr id="4" name="Date Placeholder 3"/>
           <p:cNvSpPr>
             <a:spLocks noGrp="1"/>
           </p:cNvSpPr>
@@ -864,7 +858,7 @@
           <a:p>
             <a:fld id="{B87BE1AF-0DBD-45C4-9B05-CB9899123DA5}" type="datetimeFigureOut">
               <a:rPr lang="bg-BG" smtClean="0"/>
-              <a:t>1.7.2022 г.</a:t>
+              <a:t>3.7.2022 г.</a:t>
             </a:fld>
             <a:endParaRPr lang="bg-BG"/>
           </a:p>
@@ -872,13 +866,7 @@
       </p:sp>
       <p:sp>
         <p:nvSpPr>
-          <p:cNvPr id="5" name="Контейнер за долния колонтитул 4">
-            <a:extLst>
-              <a:ext uri="{FF2B5EF4-FFF2-40B4-BE49-F238E27FC236}">
-                <a16:creationId xmlns:a16="http://schemas.microsoft.com/office/drawing/2014/main" id="{A601313F-B098-4989-B187-6CBB4B804433}"/>
-              </a:ext>
-            </a:extLst>
-          </p:cNvPr>
+          <p:cNvPr id="5" name="Footer Placeholder 4"/>
           <p:cNvSpPr>
             <a:spLocks noGrp="1"/>
           </p:cNvSpPr>
@@ -897,13 +885,7 @@
       </p:sp>
       <p:sp>
         <p:nvSpPr>
-          <p:cNvPr id="6" name="Контейнер за номер на слайда 5">
-            <a:extLst>
-              <a:ext uri="{FF2B5EF4-FFF2-40B4-BE49-F238E27FC236}">
-                <a16:creationId xmlns:a16="http://schemas.microsoft.com/office/drawing/2014/main" id="{6F5B1693-ACA2-478A-A5DF-19D89057729D}"/>
-              </a:ext>
-            </a:extLst>
-          </p:cNvPr>
+          <p:cNvPr id="6" name="Slide Number Placeholder 5"/>
           <p:cNvSpPr>
             <a:spLocks noGrp="1"/>
           </p:cNvSpPr>
@@ -927,7 +909,7 @@
     </p:spTree>
     <p:extLst>
       <p:ext uri="{BB962C8B-B14F-4D97-AF65-F5344CB8AC3E}">
-        <p14:creationId xmlns:p14="http://schemas.microsoft.com/office/powerpoint/2010/main" val="3206487003"/>
+        <p14:creationId xmlns:p14="http://schemas.microsoft.com/office/powerpoint/2010/main" val="1802818407"/>
       </p:ext>
     </p:extLst>
   </p:cSld>
@@ -956,13 +938,7 @@
       </p:grpSpPr>
       <p:sp>
         <p:nvSpPr>
-          <p:cNvPr id="2" name="Заглавие 1">
-            <a:extLst>
-              <a:ext uri="{FF2B5EF4-FFF2-40B4-BE49-F238E27FC236}">
-                <a16:creationId xmlns:a16="http://schemas.microsoft.com/office/drawing/2014/main" id="{7C8339C7-19E3-4CEF-8082-50B4FFD8293F}"/>
-              </a:ext>
-            </a:extLst>
-          </p:cNvPr>
+          <p:cNvPr id="2" name="Title 1"/>
           <p:cNvSpPr>
             <a:spLocks noGrp="1"/>
           </p:cNvSpPr>
@@ -972,63 +948,68 @@
         </p:nvSpPr>
         <p:spPr>
           <a:xfrm>
-            <a:off x="831850" y="1709738"/>
-            <a:ext cx="10515600" cy="2852737"/>
+            <a:off x="603504" y="767419"/>
+            <a:ext cx="10780776" cy="3355848"/>
           </a:xfrm>
         </p:spPr>
         <p:txBody>
-          <a:bodyPr anchor="b"/>
+          <a:bodyPr anchor="b">
+            <a:normAutofit/>
+          </a:bodyPr>
           <a:lstStyle>
             <a:lvl1pPr>
-              <a:defRPr sz="6000"/>
-            </a:lvl1pPr>
-          </a:lstStyle>
-          <a:p>
-            <a:r>
-              <a:rPr lang="bg-BG"/>
-              <a:t>Редакт. стил загл. образец</a:t>
-            </a:r>
-          </a:p>
-        </p:txBody>
-      </p:sp>
-      <p:sp>
-        <p:nvSpPr>
-          <p:cNvPr id="3" name="Текстов контейнер 2">
-            <a:extLst>
-              <a:ext uri="{FF2B5EF4-FFF2-40B4-BE49-F238E27FC236}">
-                <a16:creationId xmlns:a16="http://schemas.microsoft.com/office/drawing/2014/main" id="{F007E514-FF9C-4290-8AD1-D90A2A8A385F}"/>
-              </a:ext>
-            </a:extLst>
-          </p:cNvPr>
-          <p:cNvSpPr>
-            <a:spLocks noGrp="1"/>
-          </p:cNvSpPr>
-          <p:nvPr>
-            <p:ph type="body" idx="1"/>
-          </p:nvPr>
-        </p:nvSpPr>
-        <p:spPr>
-          <a:xfrm>
-            <a:off x="831850" y="4589463"/>
-            <a:ext cx="10515600" cy="1500187"/>
-          </a:xfrm>
-        </p:spPr>
-        <p:txBody>
-          <a:bodyPr/>
-          <a:lstStyle>
-            <a:lvl1pPr marL="0" indent="0">
-              <a:buNone/>
-              <a:defRPr sz="2400">
+              <a:lnSpc>
+                <a:spcPct val="80000"/>
+              </a:lnSpc>
+              <a:defRPr sz="8800" b="0" baseline="0">
                 <a:solidFill>
-                  <a:schemeClr val="tx1">
-                    <a:tint val="75000"/>
-                  </a:schemeClr>
+                  <a:schemeClr val="accent1"/>
                 </a:solidFill>
               </a:defRPr>
             </a:lvl1pPr>
+          </a:lstStyle>
+          <a:p>
+            <a:r>
+              <a:rPr lang="bg-BG"/>
+              <a:t>Редакт. стил загл. образец</a:t>
+            </a:r>
+            <a:endParaRPr lang="en-US" dirty="0"/>
+          </a:p>
+        </p:txBody>
+      </p:sp>
+      <p:sp>
+        <p:nvSpPr>
+          <p:cNvPr id="3" name="Text Placeholder 2"/>
+          <p:cNvSpPr>
+            <a:spLocks noGrp="1"/>
+          </p:cNvSpPr>
+          <p:nvPr>
+            <p:ph type="body" idx="1"/>
+          </p:nvPr>
+        </p:nvSpPr>
+        <p:spPr>
+          <a:xfrm>
+            <a:off x="667512" y="4204209"/>
+            <a:ext cx="9226296" cy="1645920"/>
+          </a:xfrm>
+        </p:spPr>
+        <p:txBody>
+          <a:bodyPr anchor="t">
+            <a:normAutofit/>
+          </a:bodyPr>
+          <a:lstStyle>
+            <a:lvl1pPr marL="0" indent="0">
+              <a:buNone/>
+              <a:defRPr sz="3200">
+                <a:solidFill>
+                  <a:schemeClr val="tx1"/>
+                </a:solidFill>
+                <a:latin typeface="+mj-lt"/>
+              </a:defRPr>
+            </a:lvl1pPr>
             <a:lvl2pPr marL="457200" indent="0">
               <a:buNone/>
-              <a:defRPr sz="2000">
+              <a:defRPr sz="1800">
                 <a:solidFill>
                   <a:schemeClr val="tx1">
                     <a:tint val="75000"/>
@@ -1038,7 +1019,7 @@
             </a:lvl2pPr>
             <a:lvl3pPr marL="914400" indent="0">
               <a:buNone/>
-              <a:defRPr sz="1800">
+              <a:defRPr sz="1600">
                 <a:solidFill>
                   <a:schemeClr val="tx1">
                     <a:tint val="75000"/>
@@ -1048,7 +1029,7 @@
             </a:lvl3pPr>
             <a:lvl4pPr marL="1371600" indent="0">
               <a:buNone/>
-              <a:defRPr sz="1600">
+              <a:defRPr sz="1400">
                 <a:solidFill>
                   <a:schemeClr val="tx1">
                     <a:tint val="75000"/>
@@ -1058,7 +1039,7 @@
             </a:lvl4pPr>
             <a:lvl5pPr marL="1828800" indent="0">
               <a:buNone/>
-              <a:defRPr sz="1600">
+              <a:defRPr sz="1400">
                 <a:solidFill>
                   <a:schemeClr val="tx1">
                     <a:tint val="75000"/>
@@ -1068,7 +1049,7 @@
             </a:lvl5pPr>
             <a:lvl6pPr marL="2286000" indent="0">
               <a:buNone/>
-              <a:defRPr sz="1600">
+              <a:defRPr sz="1400">
                 <a:solidFill>
                   <a:schemeClr val="tx1">
                     <a:tint val="75000"/>
@@ -1078,7 +1059,7 @@
             </a:lvl6pPr>
             <a:lvl7pPr marL="2743200" indent="0">
               <a:buNone/>
-              <a:defRPr sz="1600">
+              <a:defRPr sz="1400">
                 <a:solidFill>
                   <a:schemeClr val="tx1">
                     <a:tint val="75000"/>
@@ -1088,7 +1069,7 @@
             </a:lvl7pPr>
             <a:lvl8pPr marL="3200400" indent="0">
               <a:buNone/>
-              <a:defRPr sz="1600">
+              <a:defRPr sz="1400">
                 <a:solidFill>
                   <a:schemeClr val="tx1">
                     <a:tint val="75000"/>
@@ -1098,7 +1079,7 @@
             </a:lvl8pPr>
             <a:lvl9pPr marL="3657600" indent="0">
               <a:buNone/>
-              <a:defRPr sz="1600">
+              <a:defRPr sz="1400">
                 <a:solidFill>
                   <a:schemeClr val="tx1">
                     <a:tint val="75000"/>
@@ -1118,13 +1099,7 @@
       </p:sp>
       <p:sp>
         <p:nvSpPr>
-          <p:cNvPr id="4" name="Контейнер за дата 3">
-            <a:extLst>
-              <a:ext uri="{FF2B5EF4-FFF2-40B4-BE49-F238E27FC236}">
-                <a16:creationId xmlns:a16="http://schemas.microsoft.com/office/drawing/2014/main" id="{8DF5395F-CC04-4112-A01B-3C19A25B27E5}"/>
-              </a:ext>
-            </a:extLst>
-          </p:cNvPr>
+          <p:cNvPr id="4" name="Date Placeholder 3"/>
           <p:cNvSpPr>
             <a:spLocks noGrp="1"/>
           </p:cNvSpPr>
@@ -1139,7 +1114,7 @@
           <a:p>
             <a:fld id="{B87BE1AF-0DBD-45C4-9B05-CB9899123DA5}" type="datetimeFigureOut">
               <a:rPr lang="bg-BG" smtClean="0"/>
-              <a:t>1.7.2022 г.</a:t>
+              <a:t>3.7.2022 г.</a:t>
             </a:fld>
             <a:endParaRPr lang="bg-BG"/>
           </a:p>
@@ -1147,13 +1122,7 @@
       </p:sp>
       <p:sp>
         <p:nvSpPr>
-          <p:cNvPr id="5" name="Контейнер за долния колонтитул 4">
-            <a:extLst>
-              <a:ext uri="{FF2B5EF4-FFF2-40B4-BE49-F238E27FC236}">
-                <a16:creationId xmlns:a16="http://schemas.microsoft.com/office/drawing/2014/main" id="{774B880E-B095-45E5-8751-B17706825310}"/>
-              </a:ext>
-            </a:extLst>
-          </p:cNvPr>
+          <p:cNvPr id="5" name="Footer Placeholder 4"/>
           <p:cNvSpPr>
             <a:spLocks noGrp="1"/>
           </p:cNvSpPr>
@@ -1172,13 +1141,7 @@
       </p:sp>
       <p:sp>
         <p:nvSpPr>
-          <p:cNvPr id="6" name="Контейнер за номер на слайда 5">
-            <a:extLst>
-              <a:ext uri="{FF2B5EF4-FFF2-40B4-BE49-F238E27FC236}">
-                <a16:creationId xmlns:a16="http://schemas.microsoft.com/office/drawing/2014/main" id="{C48235C6-17F8-4795-80C3-E653E558314A}"/>
-              </a:ext>
-            </a:extLst>
-          </p:cNvPr>
+          <p:cNvPr id="6" name="Slide Number Placeholder 5"/>
           <p:cNvSpPr>
             <a:spLocks noGrp="1"/>
           </p:cNvSpPr>
@@ -1202,7 +1165,7 @@
     </p:spTree>
     <p:extLst>
       <p:ext uri="{BB962C8B-B14F-4D97-AF65-F5344CB8AC3E}">
-        <p14:creationId xmlns:p14="http://schemas.microsoft.com/office/powerpoint/2010/main" val="3089330853"/>
+        <p14:creationId xmlns:p14="http://schemas.microsoft.com/office/powerpoint/2010/main" val="2536423234"/>
       </p:ext>
     </p:extLst>
   </p:cSld>
@@ -1231,13 +1194,7 @@
       </p:grpSpPr>
       <p:sp>
         <p:nvSpPr>
-          <p:cNvPr id="2" name="Заглавие 1">
-            <a:extLst>
-              <a:ext uri="{FF2B5EF4-FFF2-40B4-BE49-F238E27FC236}">
-                <a16:creationId xmlns:a16="http://schemas.microsoft.com/office/drawing/2014/main" id="{3B95C1EA-689B-4221-9B9E-0F70ADB37C72}"/>
-              </a:ext>
-            </a:extLst>
-          </p:cNvPr>
+          <p:cNvPr id="2" name="Title 1"/>
           <p:cNvSpPr>
             <a:spLocks noGrp="1"/>
           </p:cNvSpPr>
@@ -1254,18 +1211,13 @@
               <a:rPr lang="bg-BG"/>
               <a:t>Редакт. стил загл. образец</a:t>
             </a:r>
-          </a:p>
-        </p:txBody>
-      </p:sp>
-      <p:sp>
-        <p:nvSpPr>
-          <p:cNvPr id="3" name="Контейнер за съдържание 2">
-            <a:extLst>
-              <a:ext uri="{FF2B5EF4-FFF2-40B4-BE49-F238E27FC236}">
-                <a16:creationId xmlns:a16="http://schemas.microsoft.com/office/drawing/2014/main" id="{FE5438DE-1A00-44B7-8C0D-81D0385AEEC8}"/>
-              </a:ext>
-            </a:extLst>
-          </p:cNvPr>
+            <a:endParaRPr lang="en-US" dirty="0"/>
+          </a:p>
+        </p:txBody>
+      </p:sp>
+      <p:sp>
+        <p:nvSpPr>
+          <p:cNvPr id="3" name="Content Placeholder 2"/>
           <p:cNvSpPr>
             <a:spLocks noGrp="1"/>
           </p:cNvSpPr>
@@ -1275,13 +1227,41 @@
         </p:nvSpPr>
         <p:spPr>
           <a:xfrm>
-            <a:off x="838200" y="1825625"/>
-            <a:ext cx="5181600" cy="4351338"/>
+            <a:off x="676656" y="1998134"/>
+            <a:ext cx="4663440" cy="3767328"/>
           </a:xfrm>
         </p:spPr>
         <p:txBody>
           <a:bodyPr/>
-          <a:lstStyle/>
+          <a:lstStyle>
+            <a:lvl1pPr>
+              <a:defRPr sz="2400"/>
+            </a:lvl1pPr>
+            <a:lvl2pPr>
+              <a:defRPr sz="2000"/>
+            </a:lvl2pPr>
+            <a:lvl3pPr>
+              <a:defRPr sz="1800"/>
+            </a:lvl3pPr>
+            <a:lvl4pPr>
+              <a:defRPr sz="1600"/>
+            </a:lvl4pPr>
+            <a:lvl5pPr>
+              <a:defRPr sz="1600"/>
+            </a:lvl5pPr>
+            <a:lvl6pPr>
+              <a:defRPr sz="1600"/>
+            </a:lvl6pPr>
+            <a:lvl7pPr>
+              <a:defRPr sz="1600"/>
+            </a:lvl7pPr>
+            <a:lvl8pPr>
+              <a:defRPr sz="1600"/>
+            </a:lvl8pPr>
+            <a:lvl9pPr>
+              <a:defRPr sz="1600"/>
+            </a:lvl9pPr>
+          </a:lstStyle>
           <a:p>
             <a:pPr lvl="0"/>
             <a:r>
@@ -1316,18 +1296,13 @@
               <a:rPr lang="bg-BG"/>
               <a:t>Пето ниво</a:t>
             </a:r>
-          </a:p>
-        </p:txBody>
-      </p:sp>
-      <p:sp>
-        <p:nvSpPr>
-          <p:cNvPr id="4" name="Контейнер за съдържание 3">
-            <a:extLst>
-              <a:ext uri="{FF2B5EF4-FFF2-40B4-BE49-F238E27FC236}">
-                <a16:creationId xmlns:a16="http://schemas.microsoft.com/office/drawing/2014/main" id="{C65ACC6B-C87C-45B7-A696-67556710E6B3}"/>
-              </a:ext>
-            </a:extLst>
-          </p:cNvPr>
+            <a:endParaRPr lang="en-US" dirty="0"/>
+          </a:p>
+        </p:txBody>
+      </p:sp>
+      <p:sp>
+        <p:nvSpPr>
+          <p:cNvPr id="4" name="Content Placeholder 3"/>
           <p:cNvSpPr>
             <a:spLocks noGrp="1"/>
           </p:cNvSpPr>
@@ -1337,13 +1312,41 @@
         </p:nvSpPr>
         <p:spPr>
           <a:xfrm>
-            <a:off x="6172200" y="1825625"/>
-            <a:ext cx="5181600" cy="4351338"/>
+            <a:off x="6011330" y="1998134"/>
+            <a:ext cx="4663440" cy="3767328"/>
           </a:xfrm>
         </p:spPr>
         <p:txBody>
           <a:bodyPr/>
-          <a:lstStyle/>
+          <a:lstStyle>
+            <a:lvl1pPr>
+              <a:defRPr sz="2400"/>
+            </a:lvl1pPr>
+            <a:lvl2pPr>
+              <a:defRPr sz="2000"/>
+            </a:lvl2pPr>
+            <a:lvl3pPr>
+              <a:defRPr sz="1800"/>
+            </a:lvl3pPr>
+            <a:lvl4pPr>
+              <a:defRPr sz="1600"/>
+            </a:lvl4pPr>
+            <a:lvl5pPr>
+              <a:defRPr sz="1600"/>
+            </a:lvl5pPr>
+            <a:lvl6pPr>
+              <a:defRPr sz="1600"/>
+            </a:lvl6pPr>
+            <a:lvl7pPr>
+              <a:defRPr sz="1600"/>
+            </a:lvl7pPr>
+            <a:lvl8pPr>
+              <a:defRPr sz="1600"/>
+            </a:lvl8pPr>
+            <a:lvl9pPr>
+              <a:defRPr sz="1600"/>
+            </a:lvl9pPr>
+          </a:lstStyle>
           <a:p>
             <a:pPr lvl="0"/>
             <a:r>
@@ -1378,18 +1381,13 @@
               <a:rPr lang="bg-BG"/>
               <a:t>Пето ниво</a:t>
             </a:r>
-          </a:p>
-        </p:txBody>
-      </p:sp>
-      <p:sp>
-        <p:nvSpPr>
-          <p:cNvPr id="5" name="Контейнер за дата 4">
-            <a:extLst>
-              <a:ext uri="{FF2B5EF4-FFF2-40B4-BE49-F238E27FC236}">
-                <a16:creationId xmlns:a16="http://schemas.microsoft.com/office/drawing/2014/main" id="{EA4AAE0D-E238-46E5-8BCB-59AD569281A3}"/>
-              </a:ext>
-            </a:extLst>
-          </p:cNvPr>
+            <a:endParaRPr lang="en-US" dirty="0"/>
+          </a:p>
+        </p:txBody>
+      </p:sp>
+      <p:sp>
+        <p:nvSpPr>
+          <p:cNvPr id="5" name="Date Placeholder 4"/>
           <p:cNvSpPr>
             <a:spLocks noGrp="1"/>
           </p:cNvSpPr>
@@ -1404,7 +1402,7 @@
           <a:p>
             <a:fld id="{B87BE1AF-0DBD-45C4-9B05-CB9899123DA5}" type="datetimeFigureOut">
               <a:rPr lang="bg-BG" smtClean="0"/>
-              <a:t>1.7.2022 г.</a:t>
+              <a:t>3.7.2022 г.</a:t>
             </a:fld>
             <a:endParaRPr lang="bg-BG"/>
           </a:p>
@@ -1412,13 +1410,7 @@
       </p:sp>
       <p:sp>
         <p:nvSpPr>
-          <p:cNvPr id="6" name="Контейнер за долния колонтитул 5">
-            <a:extLst>
-              <a:ext uri="{FF2B5EF4-FFF2-40B4-BE49-F238E27FC236}">
-                <a16:creationId xmlns:a16="http://schemas.microsoft.com/office/drawing/2014/main" id="{F49DDDD4-D23D-42FB-BD36-6EC6350530C9}"/>
-              </a:ext>
-            </a:extLst>
-          </p:cNvPr>
+          <p:cNvPr id="6" name="Footer Placeholder 5"/>
           <p:cNvSpPr>
             <a:spLocks noGrp="1"/>
           </p:cNvSpPr>
@@ -1437,13 +1429,7 @@
       </p:sp>
       <p:sp>
         <p:nvSpPr>
-          <p:cNvPr id="7" name="Контейнер за номер на слайда 6">
-            <a:extLst>
-              <a:ext uri="{FF2B5EF4-FFF2-40B4-BE49-F238E27FC236}">
-                <a16:creationId xmlns:a16="http://schemas.microsoft.com/office/drawing/2014/main" id="{4B401BE0-415B-4AFE-9F07-C470FD344D2F}"/>
-              </a:ext>
-            </a:extLst>
-          </p:cNvPr>
+          <p:cNvPr id="7" name="Slide Number Placeholder 6"/>
           <p:cNvSpPr>
             <a:spLocks noGrp="1"/>
           </p:cNvSpPr>
@@ -1467,7 +1453,7 @@
     </p:spTree>
     <p:extLst>
       <p:ext uri="{BB962C8B-B14F-4D97-AF65-F5344CB8AC3E}">
-        <p14:creationId xmlns:p14="http://schemas.microsoft.com/office/powerpoint/2010/main" val="1885206229"/>
+        <p14:creationId xmlns:p14="http://schemas.microsoft.com/office/powerpoint/2010/main" val="2625190380"/>
       </p:ext>
     </p:extLst>
   </p:cSld>
@@ -1496,65 +1482,59 @@
       </p:grpSpPr>
       <p:sp>
         <p:nvSpPr>
-          <p:cNvPr id="2" name="Заглавие 1">
-            <a:extLst>
-              <a:ext uri="{FF2B5EF4-FFF2-40B4-BE49-F238E27FC236}">
-                <a16:creationId xmlns:a16="http://schemas.microsoft.com/office/drawing/2014/main" id="{18C69807-F69A-4765-81A3-CDEAA09900B5}"/>
-              </a:ext>
-            </a:extLst>
-          </p:cNvPr>
+          <p:cNvPr id="10" name="Title 9"/>
           <p:cNvSpPr>
             <a:spLocks noGrp="1"/>
           </p:cNvSpPr>
           <p:nvPr>
             <p:ph type="title"/>
+          </p:nvPr>
+        </p:nvSpPr>
+        <p:spPr/>
+        <p:txBody>
+          <a:bodyPr/>
+          <a:lstStyle/>
+          <a:p>
+            <a:r>
+              <a:rPr lang="bg-BG"/>
+              <a:t>Редакт. стил загл. образец</a:t>
+            </a:r>
+            <a:endParaRPr lang="en-US" dirty="0"/>
+          </a:p>
+        </p:txBody>
+      </p:sp>
+      <p:sp>
+        <p:nvSpPr>
+          <p:cNvPr id="3" name="Text Placeholder 2"/>
+          <p:cNvSpPr>
+            <a:spLocks noGrp="1"/>
+          </p:cNvSpPr>
+          <p:nvPr>
+            <p:ph type="body" idx="1"/>
           </p:nvPr>
         </p:nvSpPr>
         <p:spPr>
           <a:xfrm>
-            <a:off x="839788" y="365125"/>
-            <a:ext cx="10515600" cy="1325563"/>
+            <a:off x="676656" y="2040467"/>
+            <a:ext cx="4663440" cy="723400"/>
           </a:xfrm>
         </p:spPr>
         <p:txBody>
-          <a:bodyPr/>
-          <a:lstStyle/>
-          <a:p>
-            <a:r>
-              <a:rPr lang="bg-BG"/>
-              <a:t>Редакт. стил загл. образец</a:t>
-            </a:r>
-          </a:p>
-        </p:txBody>
-      </p:sp>
-      <p:sp>
-        <p:nvSpPr>
-          <p:cNvPr id="3" name="Текстов контейнер 2">
-            <a:extLst>
-              <a:ext uri="{FF2B5EF4-FFF2-40B4-BE49-F238E27FC236}">
-                <a16:creationId xmlns:a16="http://schemas.microsoft.com/office/drawing/2014/main" id="{6E1A56ED-4758-47F2-B824-7A72D3C1EDE3}"/>
-              </a:ext>
-            </a:extLst>
-          </p:cNvPr>
-          <p:cNvSpPr>
-            <a:spLocks noGrp="1"/>
-          </p:cNvSpPr>
-          <p:nvPr>
-            <p:ph type="body" idx="1"/>
-          </p:nvPr>
-        </p:nvSpPr>
-        <p:spPr>
-          <a:xfrm>
-            <a:off x="839788" y="1681163"/>
-            <a:ext cx="5157787" cy="823912"/>
-          </a:xfrm>
-        </p:spPr>
-        <p:txBody>
-          <a:bodyPr anchor="b"/>
+          <a:bodyPr anchor="ctr">
+            <a:normAutofit/>
+          </a:bodyPr>
           <a:lstStyle>
             <a:lvl1pPr marL="0" indent="0">
               <a:buNone/>
-              <a:defRPr sz="2400" b="1"/>
+              <a:defRPr sz="2200" b="0" cap="all" baseline="0">
+                <a:solidFill>
+                  <a:schemeClr val="tx1">
+                    <a:lumMod val="85000"/>
+                    <a:lumOff val="15000"/>
+                  </a:schemeClr>
+                </a:solidFill>
+                <a:latin typeface="+mj-lt"/>
+              </a:defRPr>
             </a:lvl1pPr>
             <a:lvl2pPr marL="457200" indent="0">
               <a:buNone/>
@@ -1600,13 +1580,7 @@
       </p:sp>
       <p:sp>
         <p:nvSpPr>
-          <p:cNvPr id="4" name="Контейнер за съдържание 3">
-            <a:extLst>
-              <a:ext uri="{FF2B5EF4-FFF2-40B4-BE49-F238E27FC236}">
-                <a16:creationId xmlns:a16="http://schemas.microsoft.com/office/drawing/2014/main" id="{6CA03E0D-36DD-46F5-A60A-11A34B4CD49B}"/>
-              </a:ext>
-            </a:extLst>
-          </p:cNvPr>
+          <p:cNvPr id="4" name="Content Placeholder 3"/>
           <p:cNvSpPr>
             <a:spLocks noGrp="1"/>
           </p:cNvSpPr>
@@ -1616,13 +1590,41 @@
         </p:nvSpPr>
         <p:spPr>
           <a:xfrm>
-            <a:off x="839788" y="2505075"/>
-            <a:ext cx="5157787" cy="3684588"/>
+            <a:off x="676656" y="2753084"/>
+            <a:ext cx="4663440" cy="3200400"/>
           </a:xfrm>
         </p:spPr>
         <p:txBody>
           <a:bodyPr/>
-          <a:lstStyle/>
+          <a:lstStyle>
+            <a:lvl1pPr>
+              <a:defRPr sz="2400"/>
+            </a:lvl1pPr>
+            <a:lvl2pPr>
+              <a:defRPr sz="2000"/>
+            </a:lvl2pPr>
+            <a:lvl3pPr>
+              <a:defRPr sz="1800"/>
+            </a:lvl3pPr>
+            <a:lvl4pPr>
+              <a:defRPr sz="1600"/>
+            </a:lvl4pPr>
+            <a:lvl5pPr>
+              <a:defRPr sz="1600"/>
+            </a:lvl5pPr>
+            <a:lvl6pPr>
+              <a:defRPr sz="1600"/>
+            </a:lvl6pPr>
+            <a:lvl7pPr>
+              <a:defRPr sz="1600"/>
+            </a:lvl7pPr>
+            <a:lvl8pPr>
+              <a:defRPr sz="1600"/>
+            </a:lvl8pPr>
+            <a:lvl9pPr>
+              <a:defRPr sz="1600"/>
+            </a:lvl9pPr>
+          </a:lstStyle>
           <a:p>
             <a:pPr lvl="0"/>
             <a:r>
@@ -1657,18 +1659,13 @@
               <a:rPr lang="bg-BG"/>
               <a:t>Пето ниво</a:t>
             </a:r>
-          </a:p>
-        </p:txBody>
-      </p:sp>
-      <p:sp>
-        <p:nvSpPr>
-          <p:cNvPr id="5" name="Текстов контейнер 4">
-            <a:extLst>
-              <a:ext uri="{FF2B5EF4-FFF2-40B4-BE49-F238E27FC236}">
-                <a16:creationId xmlns:a16="http://schemas.microsoft.com/office/drawing/2014/main" id="{2062C870-2BC3-43EA-BD87-758CE835BC5D}"/>
-              </a:ext>
-            </a:extLst>
-          </p:cNvPr>
+            <a:endParaRPr lang="en-US" dirty="0"/>
+          </a:p>
+        </p:txBody>
+      </p:sp>
+      <p:sp>
+        <p:nvSpPr>
+          <p:cNvPr id="5" name="Text Placeholder 4"/>
           <p:cNvSpPr>
             <a:spLocks noGrp="1"/>
           </p:cNvSpPr>
@@ -1678,16 +1675,26 @@
         </p:nvSpPr>
         <p:spPr>
           <a:xfrm>
-            <a:off x="6172200" y="1681163"/>
-            <a:ext cx="5183188" cy="823912"/>
+            <a:off x="6007608" y="2038435"/>
+            <a:ext cx="4663440" cy="722376"/>
           </a:xfrm>
         </p:spPr>
         <p:txBody>
-          <a:bodyPr anchor="b"/>
+          <a:bodyPr anchor="ctr">
+            <a:normAutofit/>
+          </a:bodyPr>
           <a:lstStyle>
             <a:lvl1pPr marL="0" indent="0">
               <a:buNone/>
-              <a:defRPr sz="2400" b="1"/>
+              <a:defRPr sz="2200" b="0" cap="all" baseline="0">
+                <a:solidFill>
+                  <a:schemeClr val="tx1">
+                    <a:lumMod val="85000"/>
+                    <a:lumOff val="15000"/>
+                  </a:schemeClr>
+                </a:solidFill>
+                <a:latin typeface="+mj-lt"/>
+              </a:defRPr>
             </a:lvl1pPr>
             <a:lvl2pPr marL="457200" indent="0">
               <a:buNone/>
@@ -1733,13 +1740,7 @@
       </p:sp>
       <p:sp>
         <p:nvSpPr>
-          <p:cNvPr id="6" name="Контейнер за съдържание 5">
-            <a:extLst>
-              <a:ext uri="{FF2B5EF4-FFF2-40B4-BE49-F238E27FC236}">
-                <a16:creationId xmlns:a16="http://schemas.microsoft.com/office/drawing/2014/main" id="{D96EE08F-1AA9-4816-9D54-67761D412D08}"/>
-              </a:ext>
-            </a:extLst>
-          </p:cNvPr>
+          <p:cNvPr id="6" name="Content Placeholder 5"/>
           <p:cNvSpPr>
             <a:spLocks noGrp="1"/>
           </p:cNvSpPr>
@@ -1749,13 +1750,41 @@
         </p:nvSpPr>
         <p:spPr>
           <a:xfrm>
-            <a:off x="6172200" y="2505075"/>
-            <a:ext cx="5183188" cy="3684588"/>
+            <a:off x="6007608" y="2750990"/>
+            <a:ext cx="4663440" cy="3200400"/>
           </a:xfrm>
         </p:spPr>
         <p:txBody>
           <a:bodyPr/>
-          <a:lstStyle/>
+          <a:lstStyle>
+            <a:lvl1pPr>
+              <a:defRPr sz="2400"/>
+            </a:lvl1pPr>
+            <a:lvl2pPr>
+              <a:defRPr sz="2000"/>
+            </a:lvl2pPr>
+            <a:lvl3pPr>
+              <a:defRPr sz="1800"/>
+            </a:lvl3pPr>
+            <a:lvl4pPr>
+              <a:defRPr sz="1600"/>
+            </a:lvl4pPr>
+            <a:lvl5pPr>
+              <a:defRPr sz="1600"/>
+            </a:lvl5pPr>
+            <a:lvl6pPr>
+              <a:defRPr sz="1600"/>
+            </a:lvl6pPr>
+            <a:lvl7pPr>
+              <a:defRPr sz="1600"/>
+            </a:lvl7pPr>
+            <a:lvl8pPr>
+              <a:defRPr sz="1600"/>
+            </a:lvl8pPr>
+            <a:lvl9pPr>
+              <a:defRPr sz="1600"/>
+            </a:lvl9pPr>
+          </a:lstStyle>
           <a:p>
             <a:pPr lvl="0"/>
             <a:r>
@@ -1790,18 +1819,13 @@
               <a:rPr lang="bg-BG"/>
               <a:t>Пето ниво</a:t>
             </a:r>
-          </a:p>
-        </p:txBody>
-      </p:sp>
-      <p:sp>
-        <p:nvSpPr>
-          <p:cNvPr id="7" name="Контейнер за дата 6">
-            <a:extLst>
-              <a:ext uri="{FF2B5EF4-FFF2-40B4-BE49-F238E27FC236}">
-                <a16:creationId xmlns:a16="http://schemas.microsoft.com/office/drawing/2014/main" id="{66BA4CCF-C89E-4791-8B2B-A2D90104AD33}"/>
-              </a:ext>
-            </a:extLst>
-          </p:cNvPr>
+            <a:endParaRPr lang="en-US" dirty="0"/>
+          </a:p>
+        </p:txBody>
+      </p:sp>
+      <p:sp>
+        <p:nvSpPr>
+          <p:cNvPr id="7" name="Date Placeholder 6"/>
           <p:cNvSpPr>
             <a:spLocks noGrp="1"/>
           </p:cNvSpPr>
@@ -1816,7 +1840,7 @@
           <a:p>
             <a:fld id="{B87BE1AF-0DBD-45C4-9B05-CB9899123DA5}" type="datetimeFigureOut">
               <a:rPr lang="bg-BG" smtClean="0"/>
-              <a:t>1.7.2022 г.</a:t>
+              <a:t>3.7.2022 г.</a:t>
             </a:fld>
             <a:endParaRPr lang="bg-BG"/>
           </a:p>
@@ -1824,13 +1848,7 @@
       </p:sp>
       <p:sp>
         <p:nvSpPr>
-          <p:cNvPr id="8" name="Контейнер за долния колонтитул 7">
-            <a:extLst>
-              <a:ext uri="{FF2B5EF4-FFF2-40B4-BE49-F238E27FC236}">
-                <a16:creationId xmlns:a16="http://schemas.microsoft.com/office/drawing/2014/main" id="{24AF8B7F-97DF-4471-8749-5F65872A143B}"/>
-              </a:ext>
-            </a:extLst>
-          </p:cNvPr>
+          <p:cNvPr id="8" name="Footer Placeholder 7"/>
           <p:cNvSpPr>
             <a:spLocks noGrp="1"/>
           </p:cNvSpPr>
@@ -1849,13 +1867,7 @@
       </p:sp>
       <p:sp>
         <p:nvSpPr>
-          <p:cNvPr id="9" name="Контейнер за номер на слайда 8">
-            <a:extLst>
-              <a:ext uri="{FF2B5EF4-FFF2-40B4-BE49-F238E27FC236}">
-                <a16:creationId xmlns:a16="http://schemas.microsoft.com/office/drawing/2014/main" id="{25633C86-07C4-4E63-B8BF-BC8A2E78743B}"/>
-              </a:ext>
-            </a:extLst>
-          </p:cNvPr>
+          <p:cNvPr id="9" name="Slide Number Placeholder 8"/>
           <p:cNvSpPr>
             <a:spLocks noGrp="1"/>
           </p:cNvSpPr>
@@ -1879,7 +1891,7 @@
     </p:spTree>
     <p:extLst>
       <p:ext uri="{BB962C8B-B14F-4D97-AF65-F5344CB8AC3E}">
-        <p14:creationId xmlns:p14="http://schemas.microsoft.com/office/powerpoint/2010/main" val="373991550"/>
+        <p14:creationId xmlns:p14="http://schemas.microsoft.com/office/powerpoint/2010/main" val="675464257"/>
       </p:ext>
     </p:extLst>
   </p:cSld>
@@ -1908,13 +1920,7 @@
       </p:grpSpPr>
       <p:sp>
         <p:nvSpPr>
-          <p:cNvPr id="2" name="Заглавие 1">
-            <a:extLst>
-              <a:ext uri="{FF2B5EF4-FFF2-40B4-BE49-F238E27FC236}">
-                <a16:creationId xmlns:a16="http://schemas.microsoft.com/office/drawing/2014/main" id="{BFD3BE31-3106-4F29-B6C3-665FE60938C8}"/>
-              </a:ext>
-            </a:extLst>
-          </p:cNvPr>
+          <p:cNvPr id="6" name="Title 5"/>
           <p:cNvSpPr>
             <a:spLocks noGrp="1"/>
           </p:cNvSpPr>
@@ -1931,18 +1937,13 @@
               <a:rPr lang="bg-BG"/>
               <a:t>Редакт. стил загл. образец</a:t>
             </a:r>
-          </a:p>
-        </p:txBody>
-      </p:sp>
-      <p:sp>
-        <p:nvSpPr>
-          <p:cNvPr id="3" name="Контейнер за дата 2">
-            <a:extLst>
-              <a:ext uri="{FF2B5EF4-FFF2-40B4-BE49-F238E27FC236}">
-                <a16:creationId xmlns:a16="http://schemas.microsoft.com/office/drawing/2014/main" id="{9648828E-8130-40C1-9AC7-895314386EF3}"/>
-              </a:ext>
-            </a:extLst>
-          </p:cNvPr>
+            <a:endParaRPr lang="en-US" dirty="0"/>
+          </a:p>
+        </p:txBody>
+      </p:sp>
+      <p:sp>
+        <p:nvSpPr>
+          <p:cNvPr id="3" name="Date Placeholder 2"/>
           <p:cNvSpPr>
             <a:spLocks noGrp="1"/>
           </p:cNvSpPr>
@@ -1957,7 +1958,7 @@
           <a:p>
             <a:fld id="{B87BE1AF-0DBD-45C4-9B05-CB9899123DA5}" type="datetimeFigureOut">
               <a:rPr lang="bg-BG" smtClean="0"/>
-              <a:t>1.7.2022 г.</a:t>
+              <a:t>3.7.2022 г.</a:t>
             </a:fld>
             <a:endParaRPr lang="bg-BG"/>
           </a:p>
@@ -1965,13 +1966,7 @@
       </p:sp>
       <p:sp>
         <p:nvSpPr>
-          <p:cNvPr id="4" name="Контейнер за долния колонтитул 3">
-            <a:extLst>
-              <a:ext uri="{FF2B5EF4-FFF2-40B4-BE49-F238E27FC236}">
-                <a16:creationId xmlns:a16="http://schemas.microsoft.com/office/drawing/2014/main" id="{98FC17F9-4CFA-404D-B157-759D6E29958F}"/>
-              </a:ext>
-            </a:extLst>
-          </p:cNvPr>
+          <p:cNvPr id="4" name="Footer Placeholder 3"/>
           <p:cNvSpPr>
             <a:spLocks noGrp="1"/>
           </p:cNvSpPr>
@@ -1990,13 +1985,7 @@
       </p:sp>
       <p:sp>
         <p:nvSpPr>
-          <p:cNvPr id="5" name="Контейнер за номер на слайда 4">
-            <a:extLst>
-              <a:ext uri="{FF2B5EF4-FFF2-40B4-BE49-F238E27FC236}">
-                <a16:creationId xmlns:a16="http://schemas.microsoft.com/office/drawing/2014/main" id="{24B72BEF-F41E-4595-A989-02E6D3D6B58E}"/>
-              </a:ext>
-            </a:extLst>
-          </p:cNvPr>
+          <p:cNvPr id="5" name="Slide Number Placeholder 4"/>
           <p:cNvSpPr>
             <a:spLocks noGrp="1"/>
           </p:cNvSpPr>
@@ -2020,7 +2009,7 @@
     </p:spTree>
     <p:extLst>
       <p:ext uri="{BB962C8B-B14F-4D97-AF65-F5344CB8AC3E}">
-        <p14:creationId xmlns:p14="http://schemas.microsoft.com/office/powerpoint/2010/main" val="511917749"/>
+        <p14:creationId xmlns:p14="http://schemas.microsoft.com/office/powerpoint/2010/main" val="1848077705"/>
       </p:ext>
     </p:extLst>
   </p:cSld>
@@ -2049,13 +2038,7 @@
       </p:grpSpPr>
       <p:sp>
         <p:nvSpPr>
-          <p:cNvPr id="2" name="Контейнер за дата 1">
-            <a:extLst>
-              <a:ext uri="{FF2B5EF4-FFF2-40B4-BE49-F238E27FC236}">
-                <a16:creationId xmlns:a16="http://schemas.microsoft.com/office/drawing/2014/main" id="{0615D011-CC34-4F4B-9D8E-ABFDAE67989D}"/>
-              </a:ext>
-            </a:extLst>
-          </p:cNvPr>
+          <p:cNvPr id="2" name="Date Placeholder 1"/>
           <p:cNvSpPr>
             <a:spLocks noGrp="1"/>
           </p:cNvSpPr>
@@ -2070,7 +2053,7 @@
           <a:p>
             <a:fld id="{B87BE1AF-0DBD-45C4-9B05-CB9899123DA5}" type="datetimeFigureOut">
               <a:rPr lang="bg-BG" smtClean="0"/>
-              <a:t>1.7.2022 г.</a:t>
+              <a:t>3.7.2022 г.</a:t>
             </a:fld>
             <a:endParaRPr lang="bg-BG"/>
           </a:p>
@@ -2078,13 +2061,7 @@
       </p:sp>
       <p:sp>
         <p:nvSpPr>
-          <p:cNvPr id="3" name="Контейнер за долния колонтитул 2">
-            <a:extLst>
-              <a:ext uri="{FF2B5EF4-FFF2-40B4-BE49-F238E27FC236}">
-                <a16:creationId xmlns:a16="http://schemas.microsoft.com/office/drawing/2014/main" id="{BE124BF9-3681-409E-AEC2-DE9681875154}"/>
-              </a:ext>
-            </a:extLst>
-          </p:cNvPr>
+          <p:cNvPr id="3" name="Footer Placeholder 2"/>
           <p:cNvSpPr>
             <a:spLocks noGrp="1"/>
           </p:cNvSpPr>
@@ -2103,13 +2080,7 @@
       </p:sp>
       <p:sp>
         <p:nvSpPr>
-          <p:cNvPr id="4" name="Контейнер за номер на слайда 3">
-            <a:extLst>
-              <a:ext uri="{FF2B5EF4-FFF2-40B4-BE49-F238E27FC236}">
-                <a16:creationId xmlns:a16="http://schemas.microsoft.com/office/drawing/2014/main" id="{EE31893C-2EC6-4458-9E87-648244CB89D8}"/>
-              </a:ext>
-            </a:extLst>
-          </p:cNvPr>
+          <p:cNvPr id="4" name="Slide Number Placeholder 3"/>
           <p:cNvSpPr>
             <a:spLocks noGrp="1"/>
           </p:cNvSpPr>
@@ -2133,7 +2104,7 @@
     </p:spTree>
     <p:extLst>
       <p:ext uri="{BB962C8B-B14F-4D97-AF65-F5344CB8AC3E}">
-        <p14:creationId xmlns:p14="http://schemas.microsoft.com/office/powerpoint/2010/main" val="2147749413"/>
+        <p14:creationId xmlns:p14="http://schemas.microsoft.com/office/powerpoint/2010/main" val="2907477679"/>
       </p:ext>
     </p:extLst>
   </p:cSld>
@@ -2162,31 +2133,69 @@
       </p:grpSpPr>
       <p:sp>
         <p:nvSpPr>
-          <p:cNvPr id="2" name="Заглавие 1">
-            <a:extLst>
-              <a:ext uri="{FF2B5EF4-FFF2-40B4-BE49-F238E27FC236}">
-                <a16:creationId xmlns:a16="http://schemas.microsoft.com/office/drawing/2014/main" id="{6B192FA9-64AA-4249-9054-0979751FFCC2}"/>
-              </a:ext>
-            </a:extLst>
-          </p:cNvPr>
-          <p:cNvSpPr>
-            <a:spLocks noGrp="1"/>
-          </p:cNvSpPr>
-          <p:nvPr>
-            <p:ph type="title"/>
-          </p:nvPr>
+          <p:cNvPr id="2" name="Rectangle 1"/>
+          <p:cNvSpPr/>
+          <p:nvPr/>
         </p:nvSpPr>
         <p:spPr>
           <a:xfrm>
-            <a:off x="839788" y="457200"/>
-            <a:ext cx="3932237" cy="1600200"/>
+            <a:off x="7620000" y="0"/>
+            <a:ext cx="4572000" cy="6858000"/>
+          </a:xfrm>
+          <a:prstGeom prst="rect">
+            <a:avLst/>
+          </a:prstGeom>
+          <a:ln>
+            <a:noFill/>
+          </a:ln>
+        </p:spPr>
+        <p:style>
+          <a:lnRef idx="2">
+            <a:schemeClr val="accent1">
+              <a:shade val="50000"/>
+            </a:schemeClr>
+          </a:lnRef>
+          <a:fillRef idx="1">
+            <a:schemeClr val="accent1"/>
+          </a:fillRef>
+          <a:effectRef idx="0">
+            <a:schemeClr val="accent1"/>
+          </a:effectRef>
+          <a:fontRef idx="minor">
+            <a:schemeClr val="lt1"/>
+          </a:fontRef>
+        </p:style>
+      </p:sp>
+      <p:sp>
+        <p:nvSpPr>
+          <p:cNvPr id="9" name="Title 8"/>
+          <p:cNvSpPr>
+            <a:spLocks noGrp="1"/>
+          </p:cNvSpPr>
+          <p:nvPr>
+            <p:ph type="title"/>
+          </p:nvPr>
+        </p:nvSpPr>
+        <p:spPr>
+          <a:xfrm>
+            <a:off x="8261404" y="542282"/>
+            <a:ext cx="3383280" cy="1920240"/>
           </a:xfrm>
         </p:spPr>
         <p:txBody>
-          <a:bodyPr anchor="b"/>
+          <a:bodyPr anchor="b">
+            <a:noAutofit/>
+          </a:bodyPr>
           <a:lstStyle>
             <a:lvl1pPr>
-              <a:defRPr sz="3200"/>
+              <a:lnSpc>
+                <a:spcPct val="85000"/>
+              </a:lnSpc>
+              <a:defRPr sz="4000">
+                <a:solidFill>
+                  <a:srgbClr val="FFFFFF"/>
+                </a:solidFill>
+              </a:defRPr>
             </a:lvl1pPr>
           </a:lstStyle>
           <a:p>
@@ -2194,18 +2203,13 @@
               <a:rPr lang="bg-BG"/>
               <a:t>Редакт. стил загл. образец</a:t>
             </a:r>
-          </a:p>
-        </p:txBody>
-      </p:sp>
-      <p:sp>
-        <p:nvSpPr>
-          <p:cNvPr id="3" name="Контейнер за съдържание 2">
-            <a:extLst>
-              <a:ext uri="{FF2B5EF4-FFF2-40B4-BE49-F238E27FC236}">
-                <a16:creationId xmlns:a16="http://schemas.microsoft.com/office/drawing/2014/main" id="{24DD1844-BDA9-4F04-84D4-20FC95C7734A}"/>
-              </a:ext>
-            </a:extLst>
-          </p:cNvPr>
+            <a:endParaRPr lang="en-US" dirty="0"/>
+          </a:p>
+        </p:txBody>
+      </p:sp>
+      <p:sp>
+        <p:nvSpPr>
+          <p:cNvPr id="3" name="Content Placeholder 2"/>
           <p:cNvSpPr>
             <a:spLocks noGrp="1"/>
           </p:cNvSpPr>
@@ -2215,8 +2219,8 @@
         </p:nvSpPr>
         <p:spPr>
           <a:xfrm>
-            <a:off x="5183188" y="987425"/>
-            <a:ext cx="6172200" cy="4873625"/>
+            <a:off x="762000" y="762000"/>
+            <a:ext cx="6096000" cy="4572000"/>
           </a:xfrm>
         </p:spPr>
         <p:txBody>
@@ -2284,18 +2288,13 @@
               <a:rPr lang="bg-BG"/>
               <a:t>Пето ниво</a:t>
             </a:r>
-          </a:p>
-        </p:txBody>
-      </p:sp>
-      <p:sp>
-        <p:nvSpPr>
-          <p:cNvPr id="4" name="Текстов контейнер 3">
-            <a:extLst>
-              <a:ext uri="{FF2B5EF4-FFF2-40B4-BE49-F238E27FC236}">
-                <a16:creationId xmlns:a16="http://schemas.microsoft.com/office/drawing/2014/main" id="{BEF39FA8-AE74-402F-935E-32DFC2215E12}"/>
-              </a:ext>
-            </a:extLst>
-          </p:cNvPr>
+            <a:endParaRPr lang="en-US" dirty="0"/>
+          </a:p>
+        </p:txBody>
+      </p:sp>
+      <p:sp>
+        <p:nvSpPr>
+          <p:cNvPr id="4" name="Text Placeholder 3"/>
           <p:cNvSpPr>
             <a:spLocks noGrp="1"/>
           </p:cNvSpPr>
@@ -2305,133 +2304,160 @@
         </p:nvSpPr>
         <p:spPr>
           <a:xfrm>
-            <a:off x="839788" y="2057400"/>
-            <a:ext cx="3932237" cy="3811588"/>
+            <a:off x="8275982" y="2511813"/>
+            <a:ext cx="3398520" cy="3126987"/>
           </a:xfrm>
         </p:spPr>
         <p:txBody>
+          <a:bodyPr>
+            <a:normAutofit/>
+          </a:bodyPr>
+          <a:lstStyle>
+            <a:lvl1pPr marL="0" marR="0" indent="0" algn="l" defTabSz="914400" rtl="0" eaLnBrk="1" fontAlgn="auto" latinLnBrk="0" hangingPunct="1">
+              <a:lnSpc>
+                <a:spcPct val="100000"/>
+              </a:lnSpc>
+              <a:spcBef>
+                <a:spcPts val="1200"/>
+              </a:spcBef>
+              <a:spcAft>
+                <a:spcPts val="0"/>
+              </a:spcAft>
+              <a:buClrTx/>
+              <a:buSzTx/>
+              <a:buFontTx/>
+              <a:buNone/>
+              <a:tabLst/>
+              <a:defRPr sz="1800">
+                <a:solidFill>
+                  <a:srgbClr val="262626"/>
+                </a:solidFill>
+              </a:defRPr>
+            </a:lvl1pPr>
+            <a:lvl2pPr marL="457200" indent="0">
+              <a:buNone/>
+              <a:defRPr sz="1200"/>
+            </a:lvl2pPr>
+            <a:lvl3pPr marL="914400" indent="0">
+              <a:buNone/>
+              <a:defRPr sz="1000"/>
+            </a:lvl3pPr>
+            <a:lvl4pPr marL="1371600" indent="0">
+              <a:buNone/>
+              <a:defRPr sz="900"/>
+            </a:lvl4pPr>
+            <a:lvl5pPr marL="1828800" indent="0">
+              <a:buNone/>
+              <a:defRPr sz="900"/>
+            </a:lvl5pPr>
+            <a:lvl6pPr marL="2286000" indent="0">
+              <a:buNone/>
+              <a:defRPr sz="900"/>
+            </a:lvl6pPr>
+            <a:lvl7pPr marL="2743200" indent="0">
+              <a:buNone/>
+              <a:defRPr sz="900"/>
+            </a:lvl7pPr>
+            <a:lvl8pPr marL="3200400" indent="0">
+              <a:buNone/>
+              <a:defRPr sz="900"/>
+            </a:lvl8pPr>
+            <a:lvl9pPr marL="3657600" indent="0">
+              <a:buNone/>
+              <a:defRPr sz="900"/>
+            </a:lvl9pPr>
+          </a:lstStyle>
+          <a:p>
+            <a:pPr marL="0" marR="0" lvl="0" indent="0" algn="l" defTabSz="914400" rtl="0" eaLnBrk="1" fontAlgn="auto" latinLnBrk="0" hangingPunct="1">
+              <a:lnSpc>
+                <a:spcPct val="100000"/>
+              </a:lnSpc>
+              <a:spcBef>
+                <a:spcPts val="1400"/>
+              </a:spcBef>
+              <a:spcAft>
+                <a:spcPts val="0"/>
+              </a:spcAft>
+              <a:buClrTx/>
+              <a:buSzTx/>
+              <a:buFontTx/>
+              <a:buNone/>
+              <a:tabLst/>
+              <a:defRPr/>
+            </a:pPr>
+            <a:r>
+              <a:rPr lang="bg-BG"/>
+              <a:t>Щракнете, за да редактирате стиловете на текста в образеца</a:t>
+            </a:r>
+          </a:p>
+        </p:txBody>
+      </p:sp>
+      <p:sp>
+        <p:nvSpPr>
+          <p:cNvPr id="5" name="Date Placeholder 4"/>
+          <p:cNvSpPr>
+            <a:spLocks noGrp="1"/>
+          </p:cNvSpPr>
+          <p:nvPr>
+            <p:ph type="dt" sz="half" idx="10"/>
+          </p:nvPr>
+        </p:nvSpPr>
+        <p:spPr/>
+        <p:txBody>
+          <a:bodyPr/>
+          <a:lstStyle/>
+          <a:p>
+            <a:fld id="{B87BE1AF-0DBD-45C4-9B05-CB9899123DA5}" type="datetimeFigureOut">
+              <a:rPr lang="bg-BG" smtClean="0"/>
+              <a:t>3.7.2022 г.</a:t>
+            </a:fld>
+            <a:endParaRPr lang="bg-BG"/>
+          </a:p>
+        </p:txBody>
+      </p:sp>
+      <p:sp>
+        <p:nvSpPr>
+          <p:cNvPr id="6" name="Footer Placeholder 5"/>
+          <p:cNvSpPr>
+            <a:spLocks noGrp="1"/>
+          </p:cNvSpPr>
+          <p:nvPr>
+            <p:ph type="ftr" sz="quarter" idx="11"/>
+          </p:nvPr>
+        </p:nvSpPr>
+        <p:spPr/>
+        <p:txBody>
+          <a:bodyPr/>
+          <a:lstStyle/>
+          <a:p>
+            <a:endParaRPr lang="bg-BG"/>
+          </a:p>
+        </p:txBody>
+      </p:sp>
+      <p:sp>
+        <p:nvSpPr>
+          <p:cNvPr id="7" name="Slide Number Placeholder 6"/>
+          <p:cNvSpPr>
+            <a:spLocks noGrp="1"/>
+          </p:cNvSpPr>
+          <p:nvPr>
+            <p:ph type="sldNum" sz="quarter" idx="12"/>
+          </p:nvPr>
+        </p:nvSpPr>
+        <p:spPr/>
+        <p:txBody>
           <a:bodyPr/>
           <a:lstStyle>
-            <a:lvl1pPr marL="0" indent="0">
-              <a:buNone/>
-              <a:defRPr sz="1600"/>
+            <a:lvl1pPr>
+              <a:defRPr>
+                <a:solidFill>
+                  <a:srgbClr val="FFFFFF">
+                    <a:alpha val="20000"/>
+                  </a:srgbClr>
+                </a:solidFill>
+              </a:defRPr>
             </a:lvl1pPr>
-            <a:lvl2pPr marL="457200" indent="0">
-              <a:buNone/>
-              <a:defRPr sz="1400"/>
-            </a:lvl2pPr>
-            <a:lvl3pPr marL="914400" indent="0">
-              <a:buNone/>
-              <a:defRPr sz="1200"/>
-            </a:lvl3pPr>
-            <a:lvl4pPr marL="1371600" indent="0">
-              <a:buNone/>
-              <a:defRPr sz="1000"/>
-            </a:lvl4pPr>
-            <a:lvl5pPr marL="1828800" indent="0">
-              <a:buNone/>
-              <a:defRPr sz="1000"/>
-            </a:lvl5pPr>
-            <a:lvl6pPr marL="2286000" indent="0">
-              <a:buNone/>
-              <a:defRPr sz="1000"/>
-            </a:lvl6pPr>
-            <a:lvl7pPr marL="2743200" indent="0">
-              <a:buNone/>
-              <a:defRPr sz="1000"/>
-            </a:lvl7pPr>
-            <a:lvl8pPr marL="3200400" indent="0">
-              <a:buNone/>
-              <a:defRPr sz="1000"/>
-            </a:lvl8pPr>
-            <a:lvl9pPr marL="3657600" indent="0">
-              <a:buNone/>
-              <a:defRPr sz="1000"/>
-            </a:lvl9pPr>
           </a:lstStyle>
-          <a:p>
-            <a:pPr lvl="0"/>
-            <a:r>
-              <a:rPr lang="bg-BG"/>
-              <a:t>Щракнете, за да редактирате стиловете на текста в образеца</a:t>
-            </a:r>
-          </a:p>
-        </p:txBody>
-      </p:sp>
-      <p:sp>
-        <p:nvSpPr>
-          <p:cNvPr id="5" name="Контейнер за дата 4">
-            <a:extLst>
-              <a:ext uri="{FF2B5EF4-FFF2-40B4-BE49-F238E27FC236}">
-                <a16:creationId xmlns:a16="http://schemas.microsoft.com/office/drawing/2014/main" id="{5167F88B-88ED-44C9-B8DA-58CB0BCB0D9F}"/>
-              </a:ext>
-            </a:extLst>
-          </p:cNvPr>
-          <p:cNvSpPr>
-            <a:spLocks noGrp="1"/>
-          </p:cNvSpPr>
-          <p:nvPr>
-            <p:ph type="dt" sz="half" idx="10"/>
-          </p:nvPr>
-        </p:nvSpPr>
-        <p:spPr/>
-        <p:txBody>
-          <a:bodyPr/>
-          <a:lstStyle/>
-          <a:p>
-            <a:fld id="{B87BE1AF-0DBD-45C4-9B05-CB9899123DA5}" type="datetimeFigureOut">
-              <a:rPr lang="bg-BG" smtClean="0"/>
-              <a:t>1.7.2022 г.</a:t>
-            </a:fld>
-            <a:endParaRPr lang="bg-BG"/>
-          </a:p>
-        </p:txBody>
-      </p:sp>
-      <p:sp>
-        <p:nvSpPr>
-          <p:cNvPr id="6" name="Контейнер за долния колонтитул 5">
-            <a:extLst>
-              <a:ext uri="{FF2B5EF4-FFF2-40B4-BE49-F238E27FC236}">
-                <a16:creationId xmlns:a16="http://schemas.microsoft.com/office/drawing/2014/main" id="{4E395B39-84C2-45B7-A814-14336846A829}"/>
-              </a:ext>
-            </a:extLst>
-          </p:cNvPr>
-          <p:cNvSpPr>
-            <a:spLocks noGrp="1"/>
-          </p:cNvSpPr>
-          <p:nvPr>
-            <p:ph type="ftr" sz="quarter" idx="11"/>
-          </p:nvPr>
-        </p:nvSpPr>
-        <p:spPr/>
-        <p:txBody>
-          <a:bodyPr/>
-          <a:lstStyle/>
-          <a:p>
-            <a:endParaRPr lang="bg-BG"/>
-          </a:p>
-        </p:txBody>
-      </p:sp>
-      <p:sp>
-        <p:nvSpPr>
-          <p:cNvPr id="7" name="Контейнер за номер на слайда 6">
-            <a:extLst>
-              <a:ext uri="{FF2B5EF4-FFF2-40B4-BE49-F238E27FC236}">
-                <a16:creationId xmlns:a16="http://schemas.microsoft.com/office/drawing/2014/main" id="{55216608-C159-47B7-BD3E-7D6F2B68A108}"/>
-              </a:ext>
-            </a:extLst>
-          </p:cNvPr>
-          <p:cNvSpPr>
-            <a:spLocks noGrp="1"/>
-          </p:cNvSpPr>
-          <p:nvPr>
-            <p:ph type="sldNum" sz="quarter" idx="12"/>
-          </p:nvPr>
-        </p:nvSpPr>
-        <p:spPr/>
-        <p:txBody>
-          <a:bodyPr/>
-          <a:lstStyle/>
           <a:p>
             <a:fld id="{2DFCFB94-C649-4E33-8A46-39CA7AB586A3}" type="slidenum">
               <a:rPr lang="bg-BG" smtClean="0"/>
@@ -2444,7 +2470,7 @@
     </p:spTree>
     <p:extLst>
       <p:ext uri="{BB962C8B-B14F-4D97-AF65-F5344CB8AC3E}">
-        <p14:creationId xmlns:p14="http://schemas.microsoft.com/office/powerpoint/2010/main" val="491761426"/>
+        <p14:creationId xmlns:p14="http://schemas.microsoft.com/office/powerpoint/2010/main" val="1449595936"/>
       </p:ext>
     </p:extLst>
   </p:cSld>
@@ -2457,6 +2483,14 @@
 <file path=ppt/slideLayouts/slideLayout9.xml><?xml version="1.0" encoding="utf-8"?>
 <p:sldLayout xmlns:a="http://schemas.openxmlformats.org/drawingml/2006/main" xmlns:r="http://schemas.openxmlformats.org/officeDocument/2006/relationships" xmlns:p="http://schemas.openxmlformats.org/presentationml/2006/main" type="picTx" preserve="1">
   <p:cSld name="Картина с надпис">
+    <p:bg>
+      <p:bgPr>
+        <a:solidFill>
+          <a:schemeClr val="accent1"/>
+        </a:solidFill>
+        <a:effectLst/>
+      </p:bgPr>
+    </p:bg>
     <p:spTree>
       <p:nvGrpSpPr>
         <p:cNvPr id="1" name=""/>
@@ -2473,13 +2507,7 @@
       </p:grpSpPr>
       <p:sp>
         <p:nvSpPr>
-          <p:cNvPr id="2" name="Заглавие 1">
-            <a:extLst>
-              <a:ext uri="{FF2B5EF4-FFF2-40B4-BE49-F238E27FC236}">
-                <a16:creationId xmlns:a16="http://schemas.microsoft.com/office/drawing/2014/main" id="{C2D156BA-2ADA-46E3-B1AF-2C594B3B8375}"/>
-              </a:ext>
-            </a:extLst>
-          </p:cNvPr>
+          <p:cNvPr id="2" name="Title 1"/>
           <p:cNvSpPr>
             <a:spLocks noGrp="1"/>
           </p:cNvSpPr>
@@ -2489,15 +2517,21 @@
         </p:nvSpPr>
         <p:spPr>
           <a:xfrm>
-            <a:off x="839788" y="457200"/>
-            <a:ext cx="3932237" cy="1600200"/>
+            <a:off x="649224" y="5418667"/>
+            <a:ext cx="10780776" cy="613283"/>
           </a:xfrm>
         </p:spPr>
         <p:txBody>
-          <a:bodyPr anchor="b"/>
+          <a:bodyPr anchor="b">
+            <a:normAutofit/>
+          </a:bodyPr>
           <a:lstStyle>
             <a:lvl1pPr>
-              <a:defRPr sz="3200"/>
+              <a:defRPr sz="3200" b="0">
+                <a:solidFill>
+                  <a:srgbClr val="FFFFFF"/>
+                </a:solidFill>
+              </a:defRPr>
             </a:lvl1pPr>
           </a:lstStyle>
           <a:p>
@@ -2505,20 +2539,15 @@
               <a:rPr lang="bg-BG"/>
               <a:t>Редакт. стил загл. образец</a:t>
             </a:r>
-          </a:p>
-        </p:txBody>
-      </p:sp>
-      <p:sp>
-        <p:nvSpPr>
-          <p:cNvPr id="3" name="Контейнер за картина 2">
-            <a:extLst>
-              <a:ext uri="{FF2B5EF4-FFF2-40B4-BE49-F238E27FC236}">
-                <a16:creationId xmlns:a16="http://schemas.microsoft.com/office/drawing/2014/main" id="{8F576E65-8B8A-4695-955B-19E1CDB75430}"/>
-              </a:ext>
-            </a:extLst>
-          </p:cNvPr>
-          <p:cNvSpPr>
-            <a:spLocks noGrp="1"/>
+            <a:endParaRPr lang="en-US" dirty="0"/>
+          </a:p>
+        </p:txBody>
+      </p:sp>
+      <p:sp>
+        <p:nvSpPr>
+          <p:cNvPr id="3" name="Picture Placeholder 2"/>
+          <p:cNvSpPr>
+            <a:spLocks noGrp="1" noChangeAspect="1"/>
           </p:cNvSpPr>
           <p:nvPr>
             <p:ph type="pic" idx="1"/>
@@ -2526,16 +2555,32 @@
         </p:nvSpPr>
         <p:spPr>
           <a:xfrm>
-            <a:off x="5183188" y="987425"/>
-            <a:ext cx="6172200" cy="4873625"/>
+            <a:off x="0" y="0"/>
+            <a:ext cx="12192000" cy="5330952"/>
           </a:xfrm>
+          <a:solidFill>
+            <a:schemeClr val="accent1">
+              <a:lumMod val="40000"/>
+              <a:lumOff val="60000"/>
+            </a:schemeClr>
+          </a:solidFill>
         </p:spPr>
         <p:txBody>
-          <a:bodyPr/>
+          <a:bodyPr anchor="t"/>
           <a:lstStyle>
-            <a:lvl1pPr marL="0" indent="0">
-              <a:buNone/>
-              <a:defRPr sz="3200"/>
+            <a:lvl1pPr marL="0" indent="0" algn="ctr">
+              <a:spcBef>
+                <a:spcPts val="800"/>
+              </a:spcBef>
+              <a:buNone/>
+              <a:defRPr sz="3200">
+                <a:solidFill>
+                  <a:schemeClr val="tx1">
+                    <a:lumMod val="75000"/>
+                    <a:lumOff val="25000"/>
+                  </a:schemeClr>
+                </a:solidFill>
+              </a:defRPr>
             </a:lvl1pPr>
             <a:lvl2pPr marL="457200" indent="0">
               <a:buNone/>
@@ -2571,19 +2616,17 @@
             </a:lvl9pPr>
           </a:lstStyle>
           <a:p>
-            <a:endParaRPr lang="bg-BG"/>
-          </a:p>
-        </p:txBody>
-      </p:sp>
-      <p:sp>
-        <p:nvSpPr>
-          <p:cNvPr id="4" name="Текстов контейнер 3">
-            <a:extLst>
-              <a:ext uri="{FF2B5EF4-FFF2-40B4-BE49-F238E27FC236}">
-                <a16:creationId xmlns:a16="http://schemas.microsoft.com/office/drawing/2014/main" id="{F78271F5-9832-4976-87E3-8057D713A014}"/>
-              </a:ext>
-            </a:extLst>
-          </p:cNvPr>
+            <a:r>
+              <a:rPr lang="bg-BG"/>
+              <a:t>Щракнете върху иконата, за да добавите картина</a:t>
+            </a:r>
+            <a:endParaRPr lang="en-US" dirty="0"/>
+          </a:p>
+        </p:txBody>
+      </p:sp>
+      <p:sp>
+        <p:nvSpPr>
+          <p:cNvPr id="4" name="Text Placeholder 3"/>
           <p:cNvSpPr>
             <a:spLocks noGrp="1"/>
           </p:cNvSpPr>
@@ -2593,83 +2636,96 @@
         </p:nvSpPr>
         <p:spPr>
           <a:xfrm>
-            <a:off x="839788" y="2057400"/>
-            <a:ext cx="3932237" cy="3811588"/>
+            <a:off x="676656" y="5909735"/>
+            <a:ext cx="9229344" cy="533400"/>
           </a:xfrm>
         </p:spPr>
         <p:txBody>
+          <a:bodyPr>
+            <a:normAutofit/>
+          </a:bodyPr>
+          <a:lstStyle>
+            <a:lvl1pPr marL="0" indent="0">
+              <a:lnSpc>
+                <a:spcPct val="90000"/>
+              </a:lnSpc>
+              <a:buNone/>
+              <a:defRPr sz="1400">
+                <a:solidFill>
+                  <a:srgbClr val="262626"/>
+                </a:solidFill>
+              </a:defRPr>
+            </a:lvl1pPr>
+            <a:lvl2pPr marL="457200" indent="0">
+              <a:buNone/>
+              <a:defRPr sz="1200"/>
+            </a:lvl2pPr>
+            <a:lvl3pPr marL="914400" indent="0">
+              <a:buNone/>
+              <a:defRPr sz="1000"/>
+            </a:lvl3pPr>
+            <a:lvl4pPr marL="1371600" indent="0">
+              <a:buNone/>
+              <a:defRPr sz="900"/>
+            </a:lvl4pPr>
+            <a:lvl5pPr marL="1828800" indent="0">
+              <a:buNone/>
+              <a:defRPr sz="900"/>
+            </a:lvl5pPr>
+            <a:lvl6pPr marL="2286000" indent="0">
+              <a:buNone/>
+              <a:defRPr sz="900"/>
+            </a:lvl6pPr>
+            <a:lvl7pPr marL="2743200" indent="0">
+              <a:buNone/>
+              <a:defRPr sz="900"/>
+            </a:lvl7pPr>
+            <a:lvl8pPr marL="3200400" indent="0">
+              <a:buNone/>
+              <a:defRPr sz="900"/>
+            </a:lvl8pPr>
+            <a:lvl9pPr marL="3657600" indent="0">
+              <a:buNone/>
+              <a:defRPr sz="900"/>
+            </a:lvl9pPr>
+          </a:lstStyle>
+          <a:p>
+            <a:pPr lvl="0"/>
+            <a:r>
+              <a:rPr lang="bg-BG"/>
+              <a:t>Щракнете, за да редактирате стиловете на текста в образеца</a:t>
+            </a:r>
+          </a:p>
+        </p:txBody>
+      </p:sp>
+      <p:sp>
+        <p:nvSpPr>
+          <p:cNvPr id="12" name="Date Placeholder 11"/>
+          <p:cNvSpPr>
+            <a:spLocks noGrp="1"/>
+          </p:cNvSpPr>
+          <p:nvPr>
+            <p:ph type="dt" sz="half" idx="10"/>
+          </p:nvPr>
+        </p:nvSpPr>
+        <p:spPr/>
+        <p:txBody>
           <a:bodyPr/>
           <a:lstStyle>
-            <a:lvl1pPr marL="0" indent="0">
-              <a:buNone/>
-              <a:defRPr sz="1600"/>
+            <a:lvl1pPr>
+              <a:defRPr>
+                <a:solidFill>
+                  <a:srgbClr val="FFFFFF">
+                    <a:alpha val="80000"/>
+                  </a:srgbClr>
+                </a:solidFill>
+              </a:defRPr>
             </a:lvl1pPr>
-            <a:lvl2pPr marL="457200" indent="0">
-              <a:buNone/>
-              <a:defRPr sz="1400"/>
-            </a:lvl2pPr>
-            <a:lvl3pPr marL="914400" indent="0">
-              <a:buNone/>
-              <a:defRPr sz="1200"/>
-            </a:lvl3pPr>
-            <a:lvl4pPr marL="1371600" indent="0">
-              <a:buNone/>
-              <a:defRPr sz="1000"/>
-            </a:lvl4pPr>
-            <a:lvl5pPr marL="1828800" indent="0">
-              <a:buNone/>
-              <a:defRPr sz="1000"/>
-            </a:lvl5pPr>
-            <a:lvl6pPr marL="2286000" indent="0">
-              <a:buNone/>
-              <a:defRPr sz="1000"/>
-            </a:lvl6pPr>
-            <a:lvl7pPr marL="2743200" indent="0">
-              <a:buNone/>
-              <a:defRPr sz="1000"/>
-            </a:lvl7pPr>
-            <a:lvl8pPr marL="3200400" indent="0">
-              <a:buNone/>
-              <a:defRPr sz="1000"/>
-            </a:lvl8pPr>
-            <a:lvl9pPr marL="3657600" indent="0">
-              <a:buNone/>
-              <a:defRPr sz="1000"/>
-            </a:lvl9pPr>
           </a:lstStyle>
-          <a:p>
-            <a:pPr lvl="0"/>
-            <a:r>
-              <a:rPr lang="bg-BG"/>
-              <a:t>Щракнете, за да редактирате стиловете на текста в образеца</a:t>
-            </a:r>
-          </a:p>
-        </p:txBody>
-      </p:sp>
-      <p:sp>
-        <p:nvSpPr>
-          <p:cNvPr id="5" name="Контейнер за дата 4">
-            <a:extLst>
-              <a:ext uri="{FF2B5EF4-FFF2-40B4-BE49-F238E27FC236}">
-                <a16:creationId xmlns:a16="http://schemas.microsoft.com/office/drawing/2014/main" id="{1E63FCA6-E008-4024-BDA9-57ACBBF69FD9}"/>
-              </a:ext>
-            </a:extLst>
-          </p:cNvPr>
-          <p:cNvSpPr>
-            <a:spLocks noGrp="1"/>
-          </p:cNvSpPr>
-          <p:nvPr>
-            <p:ph type="dt" sz="half" idx="10"/>
-          </p:nvPr>
-        </p:nvSpPr>
-        <p:spPr/>
-        <p:txBody>
-          <a:bodyPr/>
-          <a:lstStyle/>
           <a:p>
             <a:fld id="{B87BE1AF-0DBD-45C4-9B05-CB9899123DA5}" type="datetimeFigureOut">
               <a:rPr lang="bg-BG" smtClean="0"/>
-              <a:t>1.7.2022 г.</a:t>
+              <a:t>3.7.2022 г.</a:t>
             </a:fld>
             <a:endParaRPr lang="bg-BG"/>
           </a:p>
@@ -2677,13 +2733,7 @@
       </p:sp>
       <p:sp>
         <p:nvSpPr>
-          <p:cNvPr id="6" name="Контейнер за долния колонтитул 5">
-            <a:extLst>
-              <a:ext uri="{FF2B5EF4-FFF2-40B4-BE49-F238E27FC236}">
-                <a16:creationId xmlns:a16="http://schemas.microsoft.com/office/drawing/2014/main" id="{3C4EB2A0-F56D-4395-A65F-5D0F46AAD2A5}"/>
-              </a:ext>
-            </a:extLst>
-          </p:cNvPr>
+          <p:cNvPr id="13" name="Footer Placeholder 12"/>
           <p:cNvSpPr>
             <a:spLocks noGrp="1"/>
           </p:cNvSpPr>
@@ -2694,7 +2744,17 @@
         <p:spPr/>
         <p:txBody>
           <a:bodyPr/>
-          <a:lstStyle/>
+          <a:lstStyle>
+            <a:lvl1pPr>
+              <a:defRPr>
+                <a:solidFill>
+                  <a:srgbClr val="FFFFFF">
+                    <a:alpha val="80000"/>
+                  </a:srgbClr>
+                </a:solidFill>
+              </a:defRPr>
+            </a:lvl1pPr>
+          </a:lstStyle>
           <a:p>
             <a:endParaRPr lang="bg-BG"/>
           </a:p>
@@ -2702,13 +2762,7 @@
       </p:sp>
       <p:sp>
         <p:nvSpPr>
-          <p:cNvPr id="7" name="Контейнер за номер на слайда 6">
-            <a:extLst>
-              <a:ext uri="{FF2B5EF4-FFF2-40B4-BE49-F238E27FC236}">
-                <a16:creationId xmlns:a16="http://schemas.microsoft.com/office/drawing/2014/main" id="{AD9FF2F4-A1C4-439D-882C-A6612EEE7ACB}"/>
-              </a:ext>
-            </a:extLst>
-          </p:cNvPr>
+          <p:cNvPr id="14" name="Slide Number Placeholder 13"/>
           <p:cNvSpPr>
             <a:spLocks noGrp="1"/>
           </p:cNvSpPr>
@@ -2719,7 +2773,17 @@
         <p:spPr/>
         <p:txBody>
           <a:bodyPr/>
-          <a:lstStyle/>
+          <a:lstStyle>
+            <a:lvl1pPr>
+              <a:defRPr>
+                <a:solidFill>
+                  <a:srgbClr val="FFFFFF">
+                    <a:alpha val="25000"/>
+                  </a:srgbClr>
+                </a:solidFill>
+              </a:defRPr>
+            </a:lvl1pPr>
+          </a:lstStyle>
           <a:p>
             <a:fld id="{2DFCFB94-C649-4E33-8A46-39CA7AB586A3}" type="slidenum">
               <a:rPr lang="bg-BG" smtClean="0"/>
@@ -2732,12 +2796,12 @@
     </p:spTree>
     <p:extLst>
       <p:ext uri="{BB962C8B-B14F-4D97-AF65-F5344CB8AC3E}">
-        <p14:creationId xmlns:p14="http://schemas.microsoft.com/office/powerpoint/2010/main" val="3035391467"/>
+        <p14:creationId xmlns:p14="http://schemas.microsoft.com/office/powerpoint/2010/main" val="2521528916"/>
       </p:ext>
     </p:extLst>
   </p:cSld>
   <p:clrMapOvr>
-    <a:masterClrMapping/>
+    <a:overrideClrMapping bg1="lt1" tx1="dk1" bg2="lt2" tx2="dk2" accent1="accent1" accent2="accent2" accent3="accent3" accent4="accent4" accent5="accent5" accent6="accent6" hlink="hlink" folHlink="folHlink"/>
   </p:clrMapOvr>
 </p:sldLayout>
 </file>
@@ -2766,13 +2830,7 @@
       </p:grpSpPr>
       <p:sp>
         <p:nvSpPr>
-          <p:cNvPr id="2" name="Контейнер за заглавие 1">
-            <a:extLst>
-              <a:ext uri="{FF2B5EF4-FFF2-40B4-BE49-F238E27FC236}">
-                <a16:creationId xmlns:a16="http://schemas.microsoft.com/office/drawing/2014/main" id="{CE23097F-6B23-4C22-B28B-67B1184DFFF3}"/>
-              </a:ext>
-            </a:extLst>
-          </p:cNvPr>
+          <p:cNvPr id="2" name="Title Placeholder 1"/>
           <p:cNvSpPr>
             <a:spLocks noGrp="1"/>
           </p:cNvSpPr>
@@ -2782,8 +2840,8 @@
         </p:nvSpPr>
         <p:spPr>
           <a:xfrm>
-            <a:off x="838200" y="365125"/>
-            <a:ext cx="10515600" cy="1325563"/>
+            <a:off x="657224" y="499533"/>
+            <a:ext cx="10772775" cy="1658198"/>
           </a:xfrm>
           <a:prstGeom prst="rect">
             <a:avLst/>
@@ -2799,18 +2857,13 @@
               <a:rPr lang="bg-BG"/>
               <a:t>Редакт. стил загл. образец</a:t>
             </a:r>
-          </a:p>
-        </p:txBody>
-      </p:sp>
-      <p:sp>
-        <p:nvSpPr>
-          <p:cNvPr id="3" name="Текстов контейнер 2">
-            <a:extLst>
-              <a:ext uri="{FF2B5EF4-FFF2-40B4-BE49-F238E27FC236}">
-                <a16:creationId xmlns:a16="http://schemas.microsoft.com/office/drawing/2014/main" id="{260025B9-427C-464B-91E2-61D9F63EFF97}"/>
-              </a:ext>
-            </a:extLst>
-          </p:cNvPr>
+            <a:endParaRPr lang="en-US" dirty="0"/>
+          </a:p>
+        </p:txBody>
+      </p:sp>
+      <p:sp>
+        <p:nvSpPr>
+          <p:cNvPr id="3" name="Text Placeholder 2"/>
           <p:cNvSpPr>
             <a:spLocks noGrp="1"/>
           </p:cNvSpPr>
@@ -2820,8 +2873,8 @@
         </p:nvSpPr>
         <p:spPr>
           <a:xfrm>
-            <a:off x="838200" y="1825625"/>
-            <a:ext cx="10515600" cy="4351338"/>
+            <a:off x="676656" y="2011680"/>
+            <a:ext cx="10753725" cy="3766185"/>
           </a:xfrm>
           <a:prstGeom prst="rect">
             <a:avLst/>
@@ -2866,18 +2919,13 @@
               <a:rPr lang="bg-BG"/>
               <a:t>Пето ниво</a:t>
             </a:r>
-          </a:p>
-        </p:txBody>
-      </p:sp>
-      <p:sp>
-        <p:nvSpPr>
-          <p:cNvPr id="4" name="Контейнер за дата 3">
-            <a:extLst>
-              <a:ext uri="{FF2B5EF4-FFF2-40B4-BE49-F238E27FC236}">
-                <a16:creationId xmlns:a16="http://schemas.microsoft.com/office/drawing/2014/main" id="{1DCE6B00-66D8-4779-8631-3F545897CA72}"/>
-              </a:ext>
-            </a:extLst>
-          </p:cNvPr>
+            <a:endParaRPr lang="en-US" dirty="0"/>
+          </a:p>
+        </p:txBody>
+      </p:sp>
+      <p:sp>
+        <p:nvSpPr>
+          <p:cNvPr id="4" name="Date Placeholder 3"/>
           <p:cNvSpPr>
             <a:spLocks noGrp="1"/>
           </p:cNvSpPr>
@@ -2887,8 +2935,8 @@
         </p:nvSpPr>
         <p:spPr>
           <a:xfrm>
-            <a:off x="838200" y="6356350"/>
-            <a:ext cx="2743200" cy="365125"/>
+            <a:off x="685800" y="6412447"/>
+            <a:ext cx="4114800" cy="228600"/>
           </a:xfrm>
           <a:prstGeom prst="rect">
             <a:avLst/>
@@ -2898,10 +2946,10 @@
           <a:bodyPr vert="horz" lIns="91440" tIns="45720" rIns="91440" bIns="45720" rtlCol="0" anchor="ctr"/>
           <a:lstStyle>
             <a:lvl1pPr algn="l">
-              <a:defRPr sz="1200">
+              <a:defRPr sz="950">
                 <a:solidFill>
                   <a:schemeClr val="tx1">
-                    <a:tint val="75000"/>
+                    <a:alpha val="80000"/>
                   </a:schemeClr>
                 </a:solidFill>
               </a:defRPr>
@@ -2910,7 +2958,7 @@
           <a:p>
             <a:fld id="{B87BE1AF-0DBD-45C4-9B05-CB9899123DA5}" type="datetimeFigureOut">
               <a:rPr lang="bg-BG" smtClean="0"/>
-              <a:t>1.7.2022 г.</a:t>
+              <a:t>3.7.2022 г.</a:t>
             </a:fld>
             <a:endParaRPr lang="bg-BG"/>
           </a:p>
@@ -2918,13 +2966,7 @@
       </p:sp>
       <p:sp>
         <p:nvSpPr>
-          <p:cNvPr id="5" name="Контейнер за долния колонтитул 4">
-            <a:extLst>
-              <a:ext uri="{FF2B5EF4-FFF2-40B4-BE49-F238E27FC236}">
-                <a16:creationId xmlns:a16="http://schemas.microsoft.com/office/drawing/2014/main" id="{E6313069-B443-44E4-93AE-10CAF02F3853}"/>
-              </a:ext>
-            </a:extLst>
-          </p:cNvPr>
+          <p:cNvPr id="5" name="Footer Placeholder 4"/>
           <p:cNvSpPr>
             <a:spLocks noGrp="1"/>
           </p:cNvSpPr>
@@ -2934,8 +2976,8 @@
         </p:nvSpPr>
         <p:spPr>
           <a:xfrm>
-            <a:off x="4038600" y="6356350"/>
-            <a:ext cx="4114800" cy="365125"/>
+            <a:off x="685800" y="6554697"/>
+            <a:ext cx="5029200" cy="228600"/>
           </a:xfrm>
           <a:prstGeom prst="rect">
             <a:avLst/>
@@ -2944,11 +2986,11 @@
         <p:txBody>
           <a:bodyPr vert="horz" lIns="91440" tIns="45720" rIns="91440" bIns="45720" rtlCol="0" anchor="ctr"/>
           <a:lstStyle>
-            <a:lvl1pPr algn="ctr">
-              <a:defRPr sz="1200">
+            <a:lvl1pPr algn="l">
+              <a:defRPr sz="950" cap="all" baseline="0">
                 <a:solidFill>
                   <a:schemeClr val="tx1">
-                    <a:tint val="75000"/>
+                    <a:alpha val="80000"/>
                   </a:schemeClr>
                 </a:solidFill>
               </a:defRPr>
@@ -2961,13 +3003,7 @@
       </p:sp>
       <p:sp>
         <p:nvSpPr>
-          <p:cNvPr id="6" name="Контейнер за номер на слайда 5">
-            <a:extLst>
-              <a:ext uri="{FF2B5EF4-FFF2-40B4-BE49-F238E27FC236}">
-                <a16:creationId xmlns:a16="http://schemas.microsoft.com/office/drawing/2014/main" id="{20618D74-9831-4F47-83A8-8B92F448CDA8}"/>
-              </a:ext>
-            </a:extLst>
-          </p:cNvPr>
+          <p:cNvPr id="6" name="Slide Number Placeholder 5"/>
           <p:cNvSpPr>
             <a:spLocks noGrp="1"/>
           </p:cNvSpPr>
@@ -2977,23 +3013,27 @@
         </p:nvSpPr>
         <p:spPr>
           <a:xfrm>
-            <a:off x="8610600" y="6356350"/>
-            <a:ext cx="2743200" cy="365125"/>
+            <a:off x="8763926" y="5876412"/>
+            <a:ext cx="2926080" cy="1397039"/>
           </a:xfrm>
           <a:prstGeom prst="rect">
             <a:avLst/>
           </a:prstGeom>
         </p:spPr>
         <p:txBody>
-          <a:bodyPr vert="horz" lIns="91440" tIns="45720" rIns="91440" bIns="45720" rtlCol="0" anchor="ctr"/>
+          <a:bodyPr vert="horz" lIns="91440" tIns="45720" rIns="91440" bIns="45720" rtlCol="0" anchor="b"/>
           <a:lstStyle>
             <a:lvl1pPr algn="r">
-              <a:defRPr sz="1200">
+              <a:defRPr sz="10300" b="0">
+                <a:ln>
+                  <a:noFill/>
+                </a:ln>
                 <a:solidFill>
-                  <a:schemeClr val="tx1">
-                    <a:tint val="75000"/>
+                  <a:schemeClr val="accent1">
+                    <a:alpha val="25000"/>
                   </a:schemeClr>
                 </a:solidFill>
+                <a:latin typeface="+mj-lt"/>
               </a:defRPr>
             </a:lvl1pPr>
           </a:lstStyle>
@@ -3009,37 +3049,37 @@
     </p:spTree>
     <p:extLst>
       <p:ext uri="{BB962C8B-B14F-4D97-AF65-F5344CB8AC3E}">
-        <p14:creationId xmlns:p14="http://schemas.microsoft.com/office/powerpoint/2010/main" val="2047173147"/>
+        <p14:creationId xmlns:p14="http://schemas.microsoft.com/office/powerpoint/2010/main" val="1877121807"/>
       </p:ext>
     </p:extLst>
   </p:cSld>
   <p:clrMap bg1="lt1" tx1="dk1" bg2="lt2" tx2="dk2" accent1="accent1" accent2="accent2" accent3="accent3" accent4="accent4" accent5="accent5" accent6="accent6" hlink="hlink" folHlink="folHlink"/>
   <p:sldLayoutIdLst>
-    <p:sldLayoutId id="2147483649" r:id="rId1"/>
-    <p:sldLayoutId id="2147483650" r:id="rId2"/>
-    <p:sldLayoutId id="2147483651" r:id="rId3"/>
-    <p:sldLayoutId id="2147483652" r:id="rId4"/>
-    <p:sldLayoutId id="2147483653" r:id="rId5"/>
-    <p:sldLayoutId id="2147483654" r:id="rId6"/>
-    <p:sldLayoutId id="2147483655" r:id="rId7"/>
-    <p:sldLayoutId id="2147483656" r:id="rId8"/>
-    <p:sldLayoutId id="2147483657" r:id="rId9"/>
-    <p:sldLayoutId id="2147483658" r:id="rId10"/>
-    <p:sldLayoutId id="2147483659" r:id="rId11"/>
+    <p:sldLayoutId id="2147483661" r:id="rId1"/>
+    <p:sldLayoutId id="2147483662" r:id="rId2"/>
+    <p:sldLayoutId id="2147483663" r:id="rId3"/>
+    <p:sldLayoutId id="2147483664" r:id="rId4"/>
+    <p:sldLayoutId id="2147483665" r:id="rId5"/>
+    <p:sldLayoutId id="2147483666" r:id="rId6"/>
+    <p:sldLayoutId id="2147483667" r:id="rId7"/>
+    <p:sldLayoutId id="2147483668" r:id="rId8"/>
+    <p:sldLayoutId id="2147483669" r:id="rId9"/>
+    <p:sldLayoutId id="2147483670" r:id="rId10"/>
+    <p:sldLayoutId id="2147483671" r:id="rId11"/>
   </p:sldLayoutIdLst>
   <p:txStyles>
     <p:titleStyle>
       <a:lvl1pPr algn="l" defTabSz="914400" rtl="0" eaLnBrk="1" latinLnBrk="0" hangingPunct="1">
         <a:lnSpc>
-          <a:spcPct val="90000"/>
+          <a:spcPct val="85000"/>
         </a:lnSpc>
         <a:spcBef>
           <a:spcPct val="0"/>
         </a:spcBef>
         <a:buNone/>
-        <a:defRPr sz="4400" kern="1200">
+        <a:defRPr sz="5400" kern="1200" spc="-120" baseline="0">
           <a:solidFill>
-            <a:schemeClr val="tx1"/>
+            <a:schemeClr val="accent1"/>
           </a:solidFill>
           <a:latin typeface="+mj-lt"/>
           <a:ea typeface="+mj-ea"/>
@@ -3048,162 +3088,189 @@
       </a:lvl1pPr>
     </p:titleStyle>
     <p:bodyStyle>
-      <a:lvl1pPr marL="228600" indent="-228600" algn="l" defTabSz="914400" rtl="0" eaLnBrk="1" latinLnBrk="0" hangingPunct="1">
+      <a:lvl1pPr marL="91440" indent="-91440" algn="l" defTabSz="914400" rtl="0" eaLnBrk="1" latinLnBrk="0" hangingPunct="1">
         <a:lnSpc>
-          <a:spcPct val="90000"/>
+          <a:spcPct val="85000"/>
         </a:lnSpc>
         <a:spcBef>
-          <a:spcPts val="1000"/>
+          <a:spcPts val="1300"/>
         </a:spcBef>
-        <a:buFont typeface="Arial" panose="020B0604020202020204" pitchFamily="34" charset="0"/>
-        <a:buChar char="•"/>
-        <a:defRPr sz="2800" kern="1200">
+        <a:buFont typeface="Arial" pitchFamily="34" charset="0"/>
+        <a:buChar char=" "/>
+        <a:defRPr sz="2400" kern="1200">
           <a:solidFill>
-            <a:schemeClr val="tx1"/>
+            <a:schemeClr val="tx1">
+              <a:lumMod val="85000"/>
+              <a:lumOff val="15000"/>
+            </a:schemeClr>
           </a:solidFill>
           <a:latin typeface="+mn-lt"/>
           <a:ea typeface="+mn-ea"/>
           <a:cs typeface="+mn-cs"/>
         </a:defRPr>
       </a:lvl1pPr>
-      <a:lvl2pPr marL="685800" indent="-228600" algn="l" defTabSz="914400" rtl="0" eaLnBrk="1" latinLnBrk="0" hangingPunct="1">
+      <a:lvl2pPr marL="347472" indent="-342900" algn="l" defTabSz="914400" rtl="0" eaLnBrk="1" latinLnBrk="0" hangingPunct="1">
         <a:lnSpc>
-          <a:spcPct val="90000"/>
+          <a:spcPct val="85000"/>
         </a:lnSpc>
         <a:spcBef>
-          <a:spcPts val="500"/>
+          <a:spcPts val="600"/>
         </a:spcBef>
-        <a:buFont typeface="Arial" panose="020B0604020202020204" pitchFamily="34" charset="0"/>
-        <a:buChar char="•"/>
+        <a:buFont typeface="Arial" pitchFamily="34" charset="0"/>
+        <a:buChar char=" "/>
         <a:defRPr sz="2400" kern="1200">
           <a:solidFill>
-            <a:schemeClr val="tx1"/>
+            <a:schemeClr val="tx1">
+              <a:lumMod val="85000"/>
+              <a:lumOff val="15000"/>
+            </a:schemeClr>
           </a:solidFill>
           <a:latin typeface="+mn-lt"/>
           <a:ea typeface="+mn-ea"/>
           <a:cs typeface="+mn-cs"/>
         </a:defRPr>
       </a:lvl2pPr>
-      <a:lvl3pPr marL="1143000" indent="-228600" algn="l" defTabSz="914400" rtl="0" eaLnBrk="1" latinLnBrk="0" hangingPunct="1">
+      <a:lvl3pPr marL="548640" indent="-548640" algn="l" defTabSz="914400" rtl="0" eaLnBrk="1" latinLnBrk="0" hangingPunct="1">
         <a:lnSpc>
-          <a:spcPct val="90000"/>
+          <a:spcPct val="85000"/>
         </a:lnSpc>
         <a:spcBef>
-          <a:spcPts val="500"/>
+          <a:spcPts val="600"/>
         </a:spcBef>
-        <a:buFont typeface="Arial" panose="020B0604020202020204" pitchFamily="34" charset="0"/>
-        <a:buChar char="•"/>
-        <a:defRPr sz="2000" kern="1200">
+        <a:buFont typeface="Arial" pitchFamily="34" charset="0"/>
+        <a:buChar char=" "/>
+        <a:defRPr sz="2000" i="1" kern="1200">
           <a:solidFill>
-            <a:schemeClr val="tx1"/>
+            <a:schemeClr val="tx1">
+              <a:lumMod val="85000"/>
+              <a:lumOff val="15000"/>
+            </a:schemeClr>
           </a:solidFill>
           <a:latin typeface="+mn-lt"/>
           <a:ea typeface="+mn-ea"/>
           <a:cs typeface="+mn-cs"/>
         </a:defRPr>
       </a:lvl3pPr>
-      <a:lvl4pPr marL="1600200" indent="-228600" algn="l" defTabSz="914400" rtl="0" eaLnBrk="1" latinLnBrk="0" hangingPunct="1">
+      <a:lvl4pPr marL="822960" indent="-822960" algn="l" defTabSz="914400" rtl="0" eaLnBrk="1" latinLnBrk="0" hangingPunct="1">
         <a:lnSpc>
-          <a:spcPct val="90000"/>
+          <a:spcPct val="85000"/>
         </a:lnSpc>
         <a:spcBef>
-          <a:spcPts val="500"/>
+          <a:spcPts val="600"/>
         </a:spcBef>
-        <a:buFont typeface="Arial" panose="020B0604020202020204" pitchFamily="34" charset="0"/>
-        <a:buChar char="•"/>
+        <a:buFont typeface="Arial" pitchFamily="34" charset="0"/>
+        <a:buChar char=" "/>
         <a:defRPr sz="1800" kern="1200">
           <a:solidFill>
-            <a:schemeClr val="tx1"/>
+            <a:schemeClr val="tx1">
+              <a:lumMod val="85000"/>
+              <a:lumOff val="15000"/>
+            </a:schemeClr>
           </a:solidFill>
           <a:latin typeface="+mn-lt"/>
           <a:ea typeface="+mn-ea"/>
           <a:cs typeface="+mn-cs"/>
         </a:defRPr>
       </a:lvl4pPr>
-      <a:lvl5pPr marL="2057400" indent="-228600" algn="l" defTabSz="914400" rtl="0" eaLnBrk="1" latinLnBrk="0" hangingPunct="1">
+      <a:lvl5pPr marL="1097280" indent="-1097280" algn="l" defTabSz="914400" rtl="0" eaLnBrk="1" latinLnBrk="0" hangingPunct="1">
         <a:lnSpc>
-          <a:spcPct val="90000"/>
+          <a:spcPct val="85000"/>
         </a:lnSpc>
         <a:spcBef>
-          <a:spcPts val="500"/>
+          <a:spcPts val="600"/>
         </a:spcBef>
-        <a:buFont typeface="Arial" panose="020B0604020202020204" pitchFamily="34" charset="0"/>
-        <a:buChar char="•"/>
+        <a:buFont typeface="Arial" pitchFamily="34" charset="0"/>
+        <a:buChar char=" "/>
         <a:defRPr sz="1800" kern="1200">
           <a:solidFill>
-            <a:schemeClr val="tx1"/>
+            <a:schemeClr val="tx1">
+              <a:lumMod val="85000"/>
+              <a:lumOff val="15000"/>
+            </a:schemeClr>
           </a:solidFill>
           <a:latin typeface="+mn-lt"/>
           <a:ea typeface="+mn-ea"/>
           <a:cs typeface="+mn-cs"/>
         </a:defRPr>
       </a:lvl5pPr>
-      <a:lvl6pPr marL="2514600" indent="-228600" algn="l" defTabSz="914400" rtl="0" eaLnBrk="1" latinLnBrk="0" hangingPunct="1">
+      <a:lvl6pPr marL="1200000" indent="-228600" algn="l" defTabSz="914400" rtl="0" eaLnBrk="1" latinLnBrk="0" hangingPunct="1">
         <a:lnSpc>
-          <a:spcPct val="90000"/>
+          <a:spcPct val="85000"/>
         </a:lnSpc>
         <a:spcBef>
-          <a:spcPts val="500"/>
+          <a:spcPts val="600"/>
         </a:spcBef>
-        <a:buFont typeface="Arial" panose="020B0604020202020204" pitchFamily="34" charset="0"/>
-        <a:buChar char="•"/>
+        <a:buFont typeface="Arial" pitchFamily="34" charset="0"/>
+        <a:buChar char=" "/>
         <a:defRPr sz="1800" kern="1200">
           <a:solidFill>
-            <a:schemeClr val="tx1"/>
+            <a:schemeClr val="tx1">
+              <a:lumMod val="85000"/>
+              <a:lumOff val="15000"/>
+            </a:schemeClr>
           </a:solidFill>
           <a:latin typeface="+mn-lt"/>
           <a:ea typeface="+mn-ea"/>
           <a:cs typeface="+mn-cs"/>
         </a:defRPr>
       </a:lvl6pPr>
-      <a:lvl7pPr marL="2971800" indent="-228600" algn="l" defTabSz="914400" rtl="0" eaLnBrk="1" latinLnBrk="0" hangingPunct="1">
+      <a:lvl7pPr marL="1400000" indent="-228600" algn="l" defTabSz="914400" rtl="0" eaLnBrk="1" latinLnBrk="0" hangingPunct="1">
         <a:lnSpc>
-          <a:spcPct val="90000"/>
+          <a:spcPct val="85000"/>
         </a:lnSpc>
         <a:spcBef>
-          <a:spcPts val="500"/>
+          <a:spcPts val="600"/>
         </a:spcBef>
-        <a:buFont typeface="Arial" panose="020B0604020202020204" pitchFamily="34" charset="0"/>
-        <a:buChar char="•"/>
+        <a:buFont typeface="Arial" pitchFamily="34" charset="0"/>
+        <a:buChar char=" "/>
         <a:defRPr sz="1800" kern="1200">
           <a:solidFill>
-            <a:schemeClr val="tx1"/>
+            <a:schemeClr val="tx1">
+              <a:lumMod val="85000"/>
+              <a:lumOff val="15000"/>
+            </a:schemeClr>
           </a:solidFill>
           <a:latin typeface="+mn-lt"/>
           <a:ea typeface="+mn-ea"/>
           <a:cs typeface="+mn-cs"/>
         </a:defRPr>
       </a:lvl7pPr>
-      <a:lvl8pPr marL="3429000" indent="-228600" algn="l" defTabSz="914400" rtl="0" eaLnBrk="1" latinLnBrk="0" hangingPunct="1">
+      <a:lvl8pPr marL="1600000" indent="-228600" algn="l" defTabSz="914400" rtl="0" eaLnBrk="1" latinLnBrk="0" hangingPunct="1">
         <a:lnSpc>
-          <a:spcPct val="90000"/>
+          <a:spcPct val="85000"/>
         </a:lnSpc>
         <a:spcBef>
-          <a:spcPts val="500"/>
+          <a:spcPts val="600"/>
         </a:spcBef>
-        <a:buFont typeface="Arial" panose="020B0604020202020204" pitchFamily="34" charset="0"/>
-        <a:buChar char="•"/>
+        <a:buFont typeface="Arial" pitchFamily="34" charset="0"/>
+        <a:buChar char=" "/>
         <a:defRPr sz="1800" kern="1200">
           <a:solidFill>
-            <a:schemeClr val="tx1"/>
+            <a:schemeClr val="tx1">
+              <a:lumMod val="85000"/>
+              <a:lumOff val="15000"/>
+            </a:schemeClr>
           </a:solidFill>
           <a:latin typeface="+mn-lt"/>
           <a:ea typeface="+mn-ea"/>
           <a:cs typeface="+mn-cs"/>
         </a:defRPr>
       </a:lvl8pPr>
-      <a:lvl9pPr marL="3886200" indent="-228600" algn="l" defTabSz="914400" rtl="0" eaLnBrk="1" latinLnBrk="0" hangingPunct="1">
+      <a:lvl9pPr marL="1800000" indent="-228600" algn="l" defTabSz="914400" rtl="0" eaLnBrk="1" latinLnBrk="0" hangingPunct="1">
         <a:lnSpc>
-          <a:spcPct val="90000"/>
+          <a:spcPct val="85000"/>
         </a:lnSpc>
         <a:spcBef>
-          <a:spcPts val="500"/>
+          <a:spcPts val="600"/>
         </a:spcBef>
-        <a:buFont typeface="Arial" panose="020B0604020202020204" pitchFamily="34" charset="0"/>
-        <a:buChar char="•"/>
+        <a:buFont typeface="Arial" pitchFamily="34" charset="0"/>
+        <a:buChar char=" "/>
         <a:defRPr sz="1800" kern="1200">
           <a:solidFill>
-            <a:schemeClr val="tx1"/>
+            <a:schemeClr val="tx1">
+              <a:lumMod val="85000"/>
+              <a:lumOff val="15000"/>
+            </a:schemeClr>
           </a:solidFill>
           <a:latin typeface="+mn-lt"/>
           <a:ea typeface="+mn-ea"/>
@@ -3213,7 +3280,7 @@
     </p:bodyStyle>
     <p:otherStyle>
       <a:defPPr>
-        <a:defRPr lang="bg-BG"/>
+        <a:defRPr lang="en-US"/>
       </a:defPPr>
       <a:lvl1pPr marL="0" algn="l" defTabSz="914400" rtl="0" eaLnBrk="1" latinLnBrk="0" hangingPunct="1">
         <a:defRPr sz="1800" kern="1200">
@@ -3446,7 +3513,9 @@
           </a:xfrm>
         </p:spPr>
         <p:txBody>
-          <a:bodyPr/>
+          <a:bodyPr>
+            <a:normAutofit fontScale="90000"/>
+          </a:bodyPr>
           <a:lstStyle/>
           <a:p>
             <a:r>
@@ -3539,7 +3608,7 @@
         <p:spPr/>
         <p:txBody>
           <a:bodyPr>
-            <a:normAutofit lnSpcReduction="10000"/>
+            <a:normAutofit fontScale="92500" lnSpcReduction="10000"/>
           </a:bodyPr>
           <a:lstStyle/>
           <a:p>
@@ -3626,7 +3695,7 @@
         <p:spPr/>
         <p:txBody>
           <a:bodyPr>
-            <a:normAutofit lnSpcReduction="10000"/>
+            <a:normAutofit fontScale="92500" lnSpcReduction="10000"/>
           </a:bodyPr>
           <a:lstStyle/>
           <a:p>
@@ -3771,7 +3840,7 @@
         <p:spPr/>
         <p:txBody>
           <a:bodyPr>
-            <a:normAutofit fontScale="85000" lnSpcReduction="20000"/>
+            <a:normAutofit fontScale="47500" lnSpcReduction="20000"/>
           </a:bodyPr>
           <a:lstStyle/>
           <a:p>
@@ -4916,7 +4985,7 @@
         <p:spPr/>
         <p:txBody>
           <a:bodyPr>
-            <a:normAutofit lnSpcReduction="10000"/>
+            <a:normAutofit fontScale="62500" lnSpcReduction="20000"/>
           </a:bodyPr>
           <a:lstStyle/>
           <a:p>
@@ -5382,9 +5451,9 @@
 </file>
 
 <file path=ppt/theme/theme1.xml><?xml version="1.0" encoding="utf-8"?>
-<a:theme xmlns:a="http://schemas.openxmlformats.org/drawingml/2006/main" name="Тема на Office">
+<a:theme xmlns:a="http://schemas.openxmlformats.org/drawingml/2006/main" name="Столичен">
   <a:themeElements>
-    <a:clrScheme name="Оffice">
+    <a:clrScheme name="Столичен">
       <a:dk1>
         <a:sysClr val="windowText" lastClr="000000"/>
       </a:dk1>
@@ -5392,44 +5461,44 @@
         <a:sysClr val="window" lastClr="FFFFFF"/>
       </a:lt1>
       <a:dk2>
-        <a:srgbClr val="44546A"/>
+        <a:srgbClr val="162F33"/>
       </a:dk2>
       <a:lt2>
-        <a:srgbClr val="E7E6E6"/>
+        <a:srgbClr val="EAF0E0"/>
       </a:lt2>
       <a:accent1>
-        <a:srgbClr val="4472C4"/>
+        <a:srgbClr val="50B4C8"/>
       </a:accent1>
       <a:accent2>
-        <a:srgbClr val="ED7D31"/>
+        <a:srgbClr val="A8B97F"/>
       </a:accent2>
       <a:accent3>
-        <a:srgbClr val="A5A5A5"/>
+        <a:srgbClr val="9B9256"/>
       </a:accent3>
       <a:accent4>
-        <a:srgbClr val="FFC000"/>
+        <a:srgbClr val="657689"/>
       </a:accent4>
       <a:accent5>
-        <a:srgbClr val="5B9BD5"/>
+        <a:srgbClr val="7A855D"/>
       </a:accent5>
       <a:accent6>
-        <a:srgbClr val="70AD47"/>
+        <a:srgbClr val="84AC9D"/>
       </a:accent6>
       <a:hlink>
-        <a:srgbClr val="0563C1"/>
+        <a:srgbClr val="2370CD"/>
       </a:hlink>
       <a:folHlink>
-        <a:srgbClr val="954F72"/>
+        <a:srgbClr val="877589"/>
       </a:folHlink>
     </a:clrScheme>
-    <a:fontScheme name="Оffice">
+    <a:fontScheme name="Столичен">
       <a:majorFont>
         <a:latin typeface="Calibri Light" panose="020F0302020204030204"/>
         <a:ea typeface=""/>
         <a:cs typeface=""/>
-        <a:font script="Jpan" typeface="游ゴシック Light"/>
+        <a:font script="Jpan" typeface="ＭＳ Ｐゴシック"/>
         <a:font script="Hang" typeface="맑은 고딕"/>
-        <a:font script="Hans" typeface="等线 Light"/>
+        <a:font script="Hans" typeface="宋体"/>
         <a:font script="Hant" typeface="新細明體"/>
         <a:font script="Arab" typeface="Times New Roman"/>
         <a:font script="Hebr" typeface="Times New Roman"/>
@@ -5457,39 +5526,22 @@
         <a:font script="Viet" typeface="Times New Roman"/>
         <a:font script="Uigh" typeface="Microsoft Uighur"/>
         <a:font script="Geor" typeface="Sylfaen"/>
-        <a:font script="Armn" typeface="Arial"/>
-        <a:font script="Bugi" typeface="Leelawadee UI"/>
-        <a:font script="Bopo" typeface="Microsoft JhengHei"/>
-        <a:font script="Java" typeface="Javanese Text"/>
-        <a:font script="Lisu" typeface="Segoe UI"/>
-        <a:font script="Mymr" typeface="Myanmar Text"/>
-        <a:font script="Nkoo" typeface="Ebrima"/>
-        <a:font script="Olck" typeface="Nirmala UI"/>
-        <a:font script="Osma" typeface="Ebrima"/>
-        <a:font script="Phag" typeface="Phagspa"/>
-        <a:font script="Syrn" typeface="Estrangelo Edessa"/>
-        <a:font script="Syrj" typeface="Estrangelo Edessa"/>
-        <a:font script="Syre" typeface="Estrangelo Edessa"/>
-        <a:font script="Sora" typeface="Nirmala UI"/>
-        <a:font script="Tale" typeface="Microsoft Tai Le"/>
-        <a:font script="Talu" typeface="Microsoft New Tai Lue"/>
-        <a:font script="Tfng" typeface="Ebrima"/>
       </a:majorFont>
       <a:minorFont>
-        <a:latin typeface="Calibri" panose="020F0502020204030204"/>
+        <a:latin typeface="Calibri Light" panose="020F0302020204030204"/>
         <a:ea typeface=""/>
         <a:cs typeface=""/>
-        <a:font script="Jpan" typeface="游ゴシック"/>
+        <a:font script="Jpan" typeface="ＭＳ Ｐゴシック"/>
         <a:font script="Hang" typeface="맑은 고딕"/>
-        <a:font script="Hans" typeface="等线"/>
+        <a:font script="Hans" typeface="宋体"/>
         <a:font script="Hant" typeface="新細明體"/>
-        <a:font script="Arab" typeface="Arial"/>
-        <a:font script="Hebr" typeface="Arial"/>
-        <a:font script="Thai" typeface="Cordia New"/>
+        <a:font script="Arab" typeface="Times New Roman"/>
+        <a:font script="Hebr" typeface="Times New Roman"/>
+        <a:font script="Thai" typeface="Angsana New"/>
         <a:font script="Ethi" typeface="Nyala"/>
         <a:font script="Beng" typeface="Vrinda"/>
         <a:font script="Gujr" typeface="Shruti"/>
-        <a:font script="Khmr" typeface="DaunPenh"/>
+        <a:font script="Khmr" typeface="MoolBoran"/>
         <a:font script="Knda" typeface="Tunga"/>
         <a:font script="Guru" typeface="Raavi"/>
         <a:font script="Cans" typeface="Euphemia"/>
@@ -5506,29 +5558,12 @@
         <a:font script="Laoo" typeface="DokChampa"/>
         <a:font script="Sinh" typeface="Iskoola Pota"/>
         <a:font script="Mong" typeface="Mongolian Baiti"/>
-        <a:font script="Viet" typeface="Arial"/>
+        <a:font script="Viet" typeface="Times New Roman"/>
         <a:font script="Uigh" typeface="Microsoft Uighur"/>
         <a:font script="Geor" typeface="Sylfaen"/>
-        <a:font script="Armn" typeface="Arial"/>
-        <a:font script="Bugi" typeface="Leelawadee UI"/>
-        <a:font script="Bopo" typeface="Microsoft JhengHei"/>
-        <a:font script="Java" typeface="Javanese Text"/>
-        <a:font script="Lisu" typeface="Segoe UI"/>
-        <a:font script="Mymr" typeface="Myanmar Text"/>
-        <a:font script="Nkoo" typeface="Ebrima"/>
-        <a:font script="Olck" typeface="Nirmala UI"/>
-        <a:font script="Osma" typeface="Ebrima"/>
-        <a:font script="Phag" typeface="Phagspa"/>
-        <a:font script="Syrn" typeface="Estrangelo Edessa"/>
-        <a:font script="Syrj" typeface="Estrangelo Edessa"/>
-        <a:font script="Syre" typeface="Estrangelo Edessa"/>
-        <a:font script="Sora" typeface="Nirmala UI"/>
-        <a:font script="Tale" typeface="Microsoft Tai Le"/>
-        <a:font script="Talu" typeface="Microsoft New Tai Lue"/>
-        <a:font script="Tfng" typeface="Ebrima"/>
       </a:minorFont>
     </a:fontScheme>
-    <a:fmtScheme name="Оffice">
+    <a:fmtScheme name="Столичен">
       <a:fillStyleLst>
         <a:solidFill>
           <a:schemeClr val="phClr"/>
@@ -5537,76 +5572,73 @@
           <a:gsLst>
             <a:gs pos="0">
               <a:schemeClr val="phClr">
+                <a:tint val="70000"/>
+                <a:satMod val="100000"/>
                 <a:lumMod val="110000"/>
-                <a:satMod val="105000"/>
-                <a:tint val="67000"/>
               </a:schemeClr>
             </a:gs>
             <a:gs pos="50000">
               <a:schemeClr val="phClr">
+                <a:tint val="75000"/>
+                <a:satMod val="101000"/>
                 <a:lumMod val="105000"/>
-                <a:satMod val="103000"/>
-                <a:tint val="73000"/>
               </a:schemeClr>
             </a:gs>
             <a:gs pos="100000">
               <a:schemeClr val="phClr">
+                <a:tint val="82000"/>
+                <a:satMod val="104000"/>
                 <a:lumMod val="105000"/>
-                <a:satMod val="109000"/>
-                <a:tint val="81000"/>
               </a:schemeClr>
             </a:gs>
           </a:gsLst>
-          <a:lin ang="5400000" scaled="0"/>
+          <a:lin ang="2700000" scaled="0"/>
         </a:gradFill>
         <a:gradFill rotWithShape="1">
           <a:gsLst>
             <a:gs pos="0">
               <a:schemeClr val="phClr">
-                <a:satMod val="103000"/>
+                <a:tint val="97000"/>
+                <a:satMod val="100000"/>
                 <a:lumMod val="102000"/>
-                <a:tint val="94000"/>
               </a:schemeClr>
             </a:gs>
             <a:gs pos="50000">
               <a:schemeClr val="phClr">
-                <a:satMod val="110000"/>
+                <a:shade val="100000"/>
+                <a:satMod val="100000"/>
                 <a:lumMod val="100000"/>
-                <a:shade val="100000"/>
               </a:schemeClr>
             </a:gs>
             <a:gs pos="100000">
               <a:schemeClr val="phClr">
+                <a:shade val="80000"/>
+                <a:satMod val="100000"/>
                 <a:lumMod val="99000"/>
-                <a:satMod val="120000"/>
-                <a:shade val="78000"/>
               </a:schemeClr>
             </a:gs>
           </a:gsLst>
-          <a:lin ang="5400000" scaled="0"/>
+          <a:lin ang="2700000" scaled="0"/>
         </a:gradFill>
       </a:fillStyleLst>
       <a:lnStyleLst>
-        <a:ln w="6350" cap="flat" cmpd="sng" algn="ctr">
+        <a:ln w="9525" cap="flat" cmpd="sng" algn="ctr">
           <a:solidFill>
             <a:schemeClr val="phClr"/>
           </a:solidFill>
           <a:prstDash val="solid"/>
-          <a:miter lim="800000"/>
         </a:ln>
         <a:ln w="12700" cap="flat" cmpd="sng" algn="ctr">
           <a:solidFill>
             <a:schemeClr val="phClr"/>
           </a:solidFill>
           <a:prstDash val="solid"/>
-          <a:miter lim="800000"/>
         </a:ln>
         <a:ln w="19050" cap="flat" cmpd="sng" algn="ctr">
           <a:solidFill>
             <a:schemeClr val="phClr"/>
           </a:solidFill>
           <a:prstDash val="solid"/>
-          <a:miter lim="800000"/>
         </a:ln>
       </a:lnStyleLst>
       <a:effectStyleLst>
@@ -5636,33 +5668,12 @@
             <a:satMod val="170000"/>
           </a:schemeClr>
         </a:solidFill>
-        <a:gradFill rotWithShape="1">
-          <a:gsLst>
-            <a:gs pos="0">
-              <a:schemeClr val="phClr">
-                <a:tint val="93000"/>
-                <a:satMod val="150000"/>
-                <a:shade val="98000"/>
-                <a:lumMod val="102000"/>
-              </a:schemeClr>
-            </a:gs>
-            <a:gs pos="50000">
-              <a:schemeClr val="phClr">
-                <a:tint val="98000"/>
-                <a:satMod val="130000"/>
-                <a:shade val="90000"/>
-                <a:lumMod val="103000"/>
-              </a:schemeClr>
-            </a:gs>
-            <a:gs pos="100000">
-              <a:schemeClr val="phClr">
-                <a:shade val="63000"/>
-                <a:satMod val="120000"/>
-              </a:schemeClr>
-            </a:gs>
-          </a:gsLst>
-          <a:lin ang="5400000" scaled="0"/>
-        </a:gradFill>
+        <a:solidFill>
+          <a:schemeClr val="phClr">
+            <a:shade val="95000"/>
+            <a:satMod val="170000"/>
+          </a:schemeClr>
+        </a:solidFill>
       </a:bgFillStyleLst>
     </a:fmtScheme>
   </a:themeElements>
@@ -5670,7 +5681,7 @@
   <a:extraClrSchemeLst/>
   <a:extLst>
     <a:ext uri="{05A4C25C-085E-4340-85A3-A5531E510DB2}">
-      <thm15:themeFamily xmlns:thm15="http://schemas.microsoft.com/office/thememl/2012/main" name="Office Theme" id="{62F939B6-93AF-4DB8-9C6B-D6C7DFDC589F}" vid="{4A3C46E8-61CC-4603-A589-7422A47A8E4A}"/>
+      <thm15:themeFamily xmlns:thm15="http://schemas.microsoft.com/office/thememl/2012/main" name="Metropolitan" id="{4C5440D6-04D2-4954-96CF-F251137069B2}" vid="{79CFCA13-9412-4290-BB4B-85112F88857B}"/>
     </a:ext>
   </a:extLst>
 </a:theme>

</xml_diff>